<commit_message>
project ppt has some changes
</commit_message>
<xml_diff>
--- a/Project.pptx
+++ b/Project.pptx
@@ -5,7 +5,7 @@
     <p:sldMasterId id="2147483684" r:id="rId1"/>
   </p:sldMasterIdLst>
   <p:notesMasterIdLst>
-    <p:notesMasterId r:id="rId18"/>
+    <p:notesMasterId r:id="rId20"/>
   </p:notesMasterIdLst>
   <p:sldIdLst>
     <p:sldId id="257" r:id="rId2"/>
@@ -19,11 +19,13 @@
     <p:sldId id="270" r:id="rId10"/>
     <p:sldId id="271" r:id="rId11"/>
     <p:sldId id="272" r:id="rId12"/>
-    <p:sldId id="273" r:id="rId13"/>
-    <p:sldId id="274" r:id="rId14"/>
-    <p:sldId id="275" r:id="rId15"/>
-    <p:sldId id="278" r:id="rId16"/>
-    <p:sldId id="276" r:id="rId17"/>
+    <p:sldId id="279" r:id="rId13"/>
+    <p:sldId id="280" r:id="rId14"/>
+    <p:sldId id="273" r:id="rId15"/>
+    <p:sldId id="274" r:id="rId16"/>
+    <p:sldId id="275" r:id="rId17"/>
+    <p:sldId id="278" r:id="rId18"/>
+    <p:sldId id="276" r:id="rId19"/>
   </p:sldIdLst>
   <p:sldSz cx="9144000" cy="6858000" type="screen4x3"/>
   <p:notesSz cx="6858000" cy="9144000"/>
@@ -122,6 +124,22 @@
       </a:defRPr>
     </a:lvl9pPr>
   </p:defaultTextStyle>
+  <p:extLst>
+    <p:ext uri="{EFAFB233-063F-42B5-8137-9DF3F51BA10A}">
+      <p15:sldGuideLst xmlns:p15="http://schemas.microsoft.com/office/powerpoint/2012/main">
+        <p15:guide id="1" orient="horz" pos="2160">
+          <p15:clr>
+            <a:srgbClr val="A4A3A4"/>
+          </p15:clr>
+        </p15:guide>
+        <p15:guide id="2" pos="2880">
+          <p15:clr>
+            <a:srgbClr val="A4A3A4"/>
+          </p15:clr>
+        </p15:guide>
+      </p15:sldGuideLst>
+    </p:ext>
+  </p:extLst>
 </p:presentation>
 </file>
 
@@ -207,7 +225,7 @@
           <a:p>
             <a:fld id="{91B64E97-ED18-4556-8612-24579C86D868}" type="datetimeFigureOut">
               <a:rPr lang="en-US" smtClean="0"/>
-              <a:t>11/19/2022</a:t>
+              <a:t>11/21/2022</a:t>
             </a:fld>
             <a:endParaRPr lang="en-US"/>
           </a:p>
@@ -271,38 +289,37 @@
           <a:p>
             <a:pPr lvl="0"/>
             <a:r>
-              <a:rPr lang="en-US" smtClean="0"/>
+              <a:rPr lang="en-US"/>
               <a:t>Click to edit Master text styles</a:t>
             </a:r>
           </a:p>
           <a:p>
             <a:pPr lvl="1"/>
             <a:r>
-              <a:rPr lang="en-US" smtClean="0"/>
+              <a:rPr lang="en-US"/>
               <a:t>Second level</a:t>
             </a:r>
           </a:p>
           <a:p>
             <a:pPr lvl="2"/>
             <a:r>
-              <a:rPr lang="en-US" smtClean="0"/>
+              <a:rPr lang="en-US"/>
               <a:t>Third level</a:t>
             </a:r>
           </a:p>
           <a:p>
             <a:pPr lvl="3"/>
             <a:r>
-              <a:rPr lang="en-US" smtClean="0"/>
+              <a:rPr lang="en-US"/>
               <a:t>Fourth level</a:t>
             </a:r>
           </a:p>
           <a:p>
             <a:pPr lvl="4"/>
             <a:r>
-              <a:rPr lang="en-US" smtClean="0"/>
+              <a:rPr lang="en-US"/>
               <a:t>Fifth level</a:t>
             </a:r>
-            <a:endParaRPr lang="en-US"/>
           </a:p>
         </p:txBody>
       </p:sp>
@@ -594,7 +611,7 @@
           <a:lstStyle/>
           <a:p>
             <a:r>
-              <a:rPr lang="en-US" sz="6600" dirty="0" smtClean="0">
+              <a:rPr lang="en-US" sz="6600" dirty="0">
                 <a:effectLst>
                   <a:outerShdw blurRad="38100" dist="38100" dir="2700000" algn="tl">
                     <a:srgbClr val="000000">
@@ -606,16 +623,6 @@
               </a:rPr>
               <a:t>{</a:t>
             </a:r>
-            <a:endParaRPr lang="en-US" sz="6600" dirty="0">
-              <a:effectLst>
-                <a:outerShdw blurRad="38100" dist="38100" dir="2700000" algn="tl">
-                  <a:srgbClr val="000000">
-                    <a:alpha val="43137"/>
-                  </a:srgbClr>
-                </a:outerShdw>
-              </a:effectLst>
-              <a:latin typeface="+mn-lt"/>
-            </a:endParaRPr>
           </a:p>
         </p:txBody>
       </p:sp>
@@ -650,7 +657,7 @@
           </a:lstStyle>
           <a:p>
             <a:r>
-              <a:rPr lang="en-US" smtClean="0"/>
+              <a:rPr lang="en-US"/>
               <a:t>Click to edit Master title style</a:t>
             </a:r>
             <a:endParaRPr lang="en-US" dirty="0"/>
@@ -767,7 +774,7 @@
           </a:lstStyle>
           <a:p>
             <a:r>
-              <a:rPr lang="en-US" smtClean="0"/>
+              <a:rPr lang="en-US"/>
               <a:t>Click to edit Master subtitle style</a:t>
             </a:r>
             <a:endParaRPr lang="en-US" dirty="0"/>
@@ -791,7 +798,7 @@
           <a:p>
             <a:fld id="{1A12113B-8394-4290-9C68-DD7F4657B786}" type="datetimeFigureOut">
               <a:rPr lang="en-US" smtClean="0"/>
-              <a:t>11/19/2022</a:t>
+              <a:t>11/21/2022</a:t>
             </a:fld>
             <a:endParaRPr lang="en-US"/>
           </a:p>
@@ -880,7 +887,7 @@
           <a:lstStyle/>
           <a:p>
             <a:r>
-              <a:rPr lang="en-US" smtClean="0"/>
+              <a:rPr lang="en-US"/>
               <a:t>Click to edit Master title style</a:t>
             </a:r>
             <a:endParaRPr lang="en-US" dirty="0"/>
@@ -909,38 +916,37 @@
           <a:p>
             <a:pPr lvl="0"/>
             <a:r>
-              <a:rPr lang="en-US" smtClean="0"/>
+              <a:rPr lang="en-US"/>
               <a:t>Click to edit Master text styles</a:t>
             </a:r>
           </a:p>
           <a:p>
             <a:pPr lvl="1"/>
             <a:r>
-              <a:rPr lang="en-US" smtClean="0"/>
+              <a:rPr lang="en-US"/>
               <a:t>Second level</a:t>
             </a:r>
           </a:p>
           <a:p>
             <a:pPr lvl="2"/>
             <a:r>
-              <a:rPr lang="en-US" smtClean="0"/>
+              <a:rPr lang="en-US"/>
               <a:t>Third level</a:t>
             </a:r>
           </a:p>
           <a:p>
             <a:pPr lvl="3"/>
             <a:r>
-              <a:rPr lang="en-US" smtClean="0"/>
+              <a:rPr lang="en-US"/>
               <a:t>Fourth level</a:t>
             </a:r>
           </a:p>
           <a:p>
             <a:pPr lvl="4"/>
             <a:r>
-              <a:rPr lang="en-US" smtClean="0"/>
+              <a:rPr lang="en-US"/>
               <a:t>Fifth level</a:t>
             </a:r>
-            <a:endParaRPr lang="en-US"/>
           </a:p>
         </p:txBody>
       </p:sp>
@@ -961,7 +967,7 @@
           <a:p>
             <a:fld id="{1A12113B-8394-4290-9C68-DD7F4657B786}" type="datetimeFigureOut">
               <a:rPr lang="en-US" smtClean="0"/>
-              <a:t>11/19/2022</a:t>
+              <a:t>11/21/2022</a:t>
             </a:fld>
             <a:endParaRPr lang="en-US"/>
           </a:p>
@@ -1055,7 +1061,7 @@
           <a:lstStyle/>
           <a:p>
             <a:r>
-              <a:rPr lang="en-US" smtClean="0"/>
+              <a:rPr lang="en-US"/>
               <a:t>Click to edit Master title style</a:t>
             </a:r>
             <a:endParaRPr lang="en-US" dirty="0"/>
@@ -1084,35 +1090,35 @@
           <a:p>
             <a:pPr lvl="0"/>
             <a:r>
-              <a:rPr lang="en-US" smtClean="0"/>
+              <a:rPr lang="en-US"/>
               <a:t>Click to edit Master text styles</a:t>
             </a:r>
           </a:p>
           <a:p>
             <a:pPr lvl="1"/>
             <a:r>
-              <a:rPr lang="en-US" smtClean="0"/>
+              <a:rPr lang="en-US"/>
               <a:t>Second level</a:t>
             </a:r>
           </a:p>
           <a:p>
             <a:pPr lvl="2"/>
             <a:r>
-              <a:rPr lang="en-US" smtClean="0"/>
+              <a:rPr lang="en-US"/>
               <a:t>Third level</a:t>
             </a:r>
           </a:p>
           <a:p>
             <a:pPr lvl="3"/>
             <a:r>
-              <a:rPr lang="en-US" smtClean="0"/>
+              <a:rPr lang="en-US"/>
               <a:t>Fourth level</a:t>
             </a:r>
           </a:p>
           <a:p>
             <a:pPr lvl="4"/>
             <a:r>
-              <a:rPr lang="en-US" smtClean="0"/>
+              <a:rPr lang="en-US"/>
               <a:t>Fifth level</a:t>
             </a:r>
             <a:endParaRPr lang="en-US" dirty="0"/>
@@ -1136,7 +1142,7 @@
           <a:p>
             <a:fld id="{1A12113B-8394-4290-9C68-DD7F4657B786}" type="datetimeFigureOut">
               <a:rPr lang="en-US" smtClean="0"/>
-              <a:t>11/19/2022</a:t>
+              <a:t>11/21/2022</a:t>
             </a:fld>
             <a:endParaRPr lang="en-US"/>
           </a:p>
@@ -1226,38 +1232,37 @@
           <a:p>
             <a:pPr lvl="0"/>
             <a:r>
-              <a:rPr lang="en-US" smtClean="0"/>
+              <a:rPr lang="en-US"/>
               <a:t>Click to edit Master text styles</a:t>
             </a:r>
           </a:p>
           <a:p>
             <a:pPr lvl="1"/>
             <a:r>
-              <a:rPr lang="en-US" smtClean="0"/>
+              <a:rPr lang="en-US"/>
               <a:t>Second level</a:t>
             </a:r>
           </a:p>
           <a:p>
             <a:pPr lvl="2"/>
             <a:r>
-              <a:rPr lang="en-US" smtClean="0"/>
+              <a:rPr lang="en-US"/>
               <a:t>Third level</a:t>
             </a:r>
           </a:p>
           <a:p>
             <a:pPr lvl="3"/>
             <a:r>
-              <a:rPr lang="en-US" smtClean="0"/>
+              <a:rPr lang="en-US"/>
               <a:t>Fourth level</a:t>
             </a:r>
           </a:p>
           <a:p>
             <a:pPr lvl="4"/>
             <a:r>
-              <a:rPr lang="en-US" smtClean="0"/>
+              <a:rPr lang="en-US"/>
               <a:t>Fifth level</a:t>
             </a:r>
-            <a:endParaRPr lang="en-US"/>
           </a:p>
         </p:txBody>
       </p:sp>
@@ -1277,10 +1282,9 @@
           <a:lstStyle/>
           <a:p>
             <a:r>
-              <a:rPr lang="en-US" smtClean="0"/>
+              <a:rPr lang="en-US"/>
               <a:t>Click to edit Master title style</a:t>
             </a:r>
-            <a:endParaRPr lang="en-US"/>
           </a:p>
         </p:txBody>
       </p:sp>
@@ -1301,7 +1305,7 @@
           <a:p>
             <a:fld id="{1A12113B-8394-4290-9C68-DD7F4657B786}" type="datetimeFigureOut">
               <a:rPr lang="en-US" smtClean="0"/>
-              <a:t>11/19/2022</a:t>
+              <a:t>11/21/2022</a:t>
             </a:fld>
             <a:endParaRPr lang="en-US"/>
           </a:p>
@@ -1397,7 +1401,7 @@
           <a:lstStyle/>
           <a:p>
             <a:r>
-              <a:rPr lang="en-US" sz="6600" dirty="0" smtClean="0">
+              <a:rPr lang="en-US" sz="6600" dirty="0">
                 <a:effectLst>
                   <a:outerShdw blurRad="38100" dist="38100" dir="2700000" algn="tl">
                     <a:srgbClr val="000000">
@@ -1409,16 +1413,6 @@
               </a:rPr>
               <a:t>{</a:t>
             </a:r>
-            <a:endParaRPr lang="en-US" sz="6600" dirty="0">
-              <a:effectLst>
-                <a:outerShdw blurRad="38100" dist="38100" dir="2700000" algn="tl">
-                  <a:srgbClr val="000000">
-                    <a:alpha val="43137"/>
-                  </a:srgbClr>
-                </a:outerShdw>
-              </a:effectLst>
-              <a:latin typeface="+mn-lt"/>
-            </a:endParaRPr>
           </a:p>
         </p:txBody>
       </p:sp>
@@ -1535,7 +1529,7 @@
           <a:p>
             <a:pPr lvl="0"/>
             <a:r>
-              <a:rPr lang="en-US" smtClean="0"/>
+              <a:rPr lang="en-US"/>
               <a:t>Click to edit Master text styles</a:t>
             </a:r>
           </a:p>
@@ -1558,7 +1552,7 @@
           <a:p>
             <a:fld id="{1A12113B-8394-4290-9C68-DD7F4657B786}" type="datetimeFigureOut">
               <a:rPr lang="en-US" smtClean="0"/>
-              <a:t>11/19/2022</a:t>
+              <a:t>11/21/2022</a:t>
             </a:fld>
             <a:endParaRPr lang="en-US"/>
           </a:p>
@@ -1649,7 +1643,7 @@
           </a:lstStyle>
           <a:p>
             <a:r>
-              <a:rPr lang="en-US" smtClean="0"/>
+              <a:rPr lang="en-US"/>
               <a:t>Click to edit Master title style</a:t>
             </a:r>
             <a:endParaRPr lang="en-US" dirty="0"/>
@@ -1698,7 +1692,7 @@
           <a:p>
             <a:fld id="{1A12113B-8394-4290-9C68-DD7F4657B786}" type="datetimeFigureOut">
               <a:rPr lang="en-US" smtClean="0"/>
-              <a:t>11/19/2022</a:t>
+              <a:t>11/21/2022</a:t>
             </a:fld>
             <a:endParaRPr lang="en-US"/>
           </a:p>
@@ -1762,7 +1756,7 @@
           <a:lstStyle/>
           <a:p>
             <a:r>
-              <a:rPr lang="en-US" smtClean="0"/>
+              <a:rPr lang="en-US"/>
               <a:t>Click to edit Master title style</a:t>
             </a:r>
             <a:endParaRPr lang="en-US" dirty="0"/>
@@ -1791,35 +1785,35 @@
           <a:p>
             <a:pPr lvl="0"/>
             <a:r>
-              <a:rPr lang="en-US" smtClean="0"/>
+              <a:rPr lang="en-US"/>
               <a:t>Click to edit Master text styles</a:t>
             </a:r>
           </a:p>
           <a:p>
             <a:pPr lvl="1"/>
             <a:r>
-              <a:rPr lang="en-US" smtClean="0"/>
+              <a:rPr lang="en-US"/>
               <a:t>Second level</a:t>
             </a:r>
           </a:p>
           <a:p>
             <a:pPr lvl="2"/>
             <a:r>
-              <a:rPr lang="en-US" smtClean="0"/>
+              <a:rPr lang="en-US"/>
               <a:t>Third level</a:t>
             </a:r>
           </a:p>
           <a:p>
             <a:pPr lvl="3"/>
             <a:r>
-              <a:rPr lang="en-US" smtClean="0"/>
+              <a:rPr lang="en-US"/>
               <a:t>Fourth level</a:t>
             </a:r>
           </a:p>
           <a:p>
             <a:pPr lvl="4"/>
             <a:r>
-              <a:rPr lang="en-US" smtClean="0"/>
+              <a:rPr lang="en-US"/>
               <a:t>Fifth level</a:t>
             </a:r>
             <a:endParaRPr lang="en-US" dirty="0"/>
@@ -1848,38 +1842,37 @@
           <a:p>
             <a:pPr lvl="0"/>
             <a:r>
-              <a:rPr lang="en-US" smtClean="0"/>
+              <a:rPr lang="en-US"/>
               <a:t>Click to edit Master text styles</a:t>
             </a:r>
           </a:p>
           <a:p>
             <a:pPr lvl="1"/>
             <a:r>
-              <a:rPr lang="en-US" smtClean="0"/>
+              <a:rPr lang="en-US"/>
               <a:t>Second level</a:t>
             </a:r>
           </a:p>
           <a:p>
             <a:pPr lvl="2"/>
             <a:r>
-              <a:rPr lang="en-US" smtClean="0"/>
+              <a:rPr lang="en-US"/>
               <a:t>Third level</a:t>
             </a:r>
           </a:p>
           <a:p>
             <a:pPr lvl="3"/>
             <a:r>
-              <a:rPr lang="en-US" smtClean="0"/>
+              <a:rPr lang="en-US"/>
               <a:t>Fourth level</a:t>
             </a:r>
           </a:p>
           <a:p>
             <a:pPr lvl="4"/>
             <a:r>
-              <a:rPr lang="en-US" smtClean="0"/>
+              <a:rPr lang="en-US"/>
               <a:t>Fifth level</a:t>
             </a:r>
-            <a:endParaRPr lang="en-US"/>
           </a:p>
         </p:txBody>
       </p:sp>
@@ -1969,7 +1962,7 @@
           <a:p>
             <a:pPr lvl="0"/>
             <a:r>
-              <a:rPr lang="en-US" smtClean="0"/>
+              <a:rPr lang="en-US"/>
               <a:t>Click to edit Master text styles</a:t>
             </a:r>
           </a:p>
@@ -2025,35 +2018,35 @@
           <a:p>
             <a:pPr lvl="0"/>
             <a:r>
-              <a:rPr lang="en-US" smtClean="0"/>
+              <a:rPr lang="en-US"/>
               <a:t>Click to edit Master text styles</a:t>
             </a:r>
           </a:p>
           <a:p>
             <a:pPr lvl="1"/>
             <a:r>
-              <a:rPr lang="en-US" smtClean="0"/>
+              <a:rPr lang="en-US"/>
               <a:t>Second level</a:t>
             </a:r>
           </a:p>
           <a:p>
             <a:pPr lvl="2"/>
             <a:r>
-              <a:rPr lang="en-US" smtClean="0"/>
+              <a:rPr lang="en-US"/>
               <a:t>Third level</a:t>
             </a:r>
           </a:p>
           <a:p>
             <a:pPr lvl="3"/>
             <a:r>
-              <a:rPr lang="en-US" smtClean="0"/>
+              <a:rPr lang="en-US"/>
               <a:t>Fourth level</a:t>
             </a:r>
           </a:p>
           <a:p>
             <a:pPr lvl="4"/>
             <a:r>
-              <a:rPr lang="en-US" smtClean="0"/>
+              <a:rPr lang="en-US"/>
               <a:t>Fifth level</a:t>
             </a:r>
             <a:endParaRPr lang="en-US" dirty="0"/>
@@ -2121,7 +2114,7 @@
           <a:p>
             <a:pPr lvl="0"/>
             <a:r>
-              <a:rPr lang="en-US" smtClean="0"/>
+              <a:rPr lang="en-US"/>
               <a:t>Click to edit Master text styles</a:t>
             </a:r>
           </a:p>
@@ -2177,35 +2170,35 @@
           <a:p>
             <a:pPr lvl="0"/>
             <a:r>
-              <a:rPr lang="en-US" smtClean="0"/>
+              <a:rPr lang="en-US"/>
               <a:t>Click to edit Master text styles</a:t>
             </a:r>
           </a:p>
           <a:p>
             <a:pPr lvl="1"/>
             <a:r>
-              <a:rPr lang="en-US" smtClean="0"/>
+              <a:rPr lang="en-US"/>
               <a:t>Second level</a:t>
             </a:r>
           </a:p>
           <a:p>
             <a:pPr lvl="2"/>
             <a:r>
-              <a:rPr lang="en-US" smtClean="0"/>
+              <a:rPr lang="en-US"/>
               <a:t>Third level</a:t>
             </a:r>
           </a:p>
           <a:p>
             <a:pPr lvl="3"/>
             <a:r>
-              <a:rPr lang="en-US" smtClean="0"/>
+              <a:rPr lang="en-US"/>
               <a:t>Fourth level</a:t>
             </a:r>
           </a:p>
           <a:p>
             <a:pPr lvl="4"/>
             <a:r>
-              <a:rPr lang="en-US" smtClean="0"/>
+              <a:rPr lang="en-US"/>
               <a:t>Fifth level</a:t>
             </a:r>
             <a:endParaRPr lang="en-US" dirty="0"/>
@@ -2235,7 +2228,7 @@
           <a:lstStyle/>
           <a:p>
             <a:r>
-              <a:rPr lang="en-US" sz="6000" dirty="0" smtClean="0">
+              <a:rPr lang="en-US" sz="6000" dirty="0">
                 <a:effectLst>
                   <a:outerShdw blurRad="38100" dist="38100" dir="2700000" algn="tl">
                     <a:srgbClr val="000000">
@@ -2247,16 +2240,6 @@
               </a:rPr>
               <a:t>{</a:t>
             </a:r>
-            <a:endParaRPr lang="en-US" sz="6000" dirty="0">
-              <a:effectLst>
-                <a:outerShdw blurRad="38100" dist="38100" dir="2700000" algn="tl">
-                  <a:srgbClr val="000000">
-                    <a:alpha val="43137"/>
-                  </a:srgbClr>
-                </a:outerShdw>
-              </a:effectLst>
-              <a:latin typeface="+mn-lt"/>
-            </a:endParaRPr>
           </a:p>
         </p:txBody>
       </p:sp>
@@ -2283,7 +2266,7 @@
           <a:lstStyle/>
           <a:p>
             <a:r>
-              <a:rPr lang="en-US" sz="6000" dirty="0" smtClean="0">
+              <a:rPr lang="en-US" sz="6000" dirty="0">
                 <a:effectLst>
                   <a:outerShdw blurRad="38100" dist="38100" dir="2700000" algn="tl">
                     <a:srgbClr val="000000">
@@ -2295,16 +2278,6 @@
               </a:rPr>
               <a:t>{</a:t>
             </a:r>
-            <a:endParaRPr lang="en-US" sz="6000" dirty="0">
-              <a:effectLst>
-                <a:outerShdw blurRad="38100" dist="38100" dir="2700000" algn="tl">
-                  <a:srgbClr val="000000">
-                    <a:alpha val="43137"/>
-                  </a:srgbClr>
-                </a:outerShdw>
-              </a:effectLst>
-              <a:latin typeface="+mn-lt"/>
-            </a:endParaRPr>
           </a:p>
         </p:txBody>
       </p:sp>
@@ -2324,7 +2297,7 @@
           <a:lstStyle/>
           <a:p>
             <a:r>
-              <a:rPr lang="en-US" smtClean="0"/>
+              <a:rPr lang="en-US"/>
               <a:t>Click to edit Master title style</a:t>
             </a:r>
             <a:endParaRPr lang="en-US" dirty="0"/>
@@ -2348,7 +2321,7 @@
           <a:p>
             <a:fld id="{1A12113B-8394-4290-9C68-DD7F4657B786}" type="datetimeFigureOut">
               <a:rPr lang="en-US" smtClean="0"/>
-              <a:t>11/19/2022</a:t>
+              <a:t>11/21/2022</a:t>
             </a:fld>
             <a:endParaRPr lang="en-US"/>
           </a:p>
@@ -2437,10 +2410,9 @@
           <a:lstStyle/>
           <a:p>
             <a:r>
-              <a:rPr lang="en-US" smtClean="0"/>
+              <a:rPr lang="en-US"/>
               <a:t>Click to edit Master title style</a:t>
             </a:r>
-            <a:endParaRPr lang="en-US"/>
           </a:p>
         </p:txBody>
       </p:sp>
@@ -2461,7 +2433,7 @@
           <a:p>
             <a:fld id="{1A12113B-8394-4290-9C68-DD7F4657B786}" type="datetimeFigureOut">
               <a:rPr lang="en-US" smtClean="0"/>
-              <a:t>11/19/2022</a:t>
+              <a:t>11/21/2022</a:t>
             </a:fld>
             <a:endParaRPr lang="en-US"/>
           </a:p>
@@ -2551,7 +2523,7 @@
           <a:p>
             <a:fld id="{1A12113B-8394-4290-9C68-DD7F4657B786}" type="datetimeFigureOut">
               <a:rPr lang="en-US" smtClean="0"/>
-              <a:t>11/19/2022</a:t>
+              <a:t>11/21/2022</a:t>
             </a:fld>
             <a:endParaRPr lang="en-US"/>
           </a:p>
@@ -2647,7 +2619,7 @@
           <a:lstStyle/>
           <a:p>
             <a:r>
-              <a:rPr lang="en-US" sz="8000" dirty="0" smtClean="0">
+              <a:rPr lang="en-US" sz="8000" dirty="0">
                 <a:effectLst>
                   <a:outerShdw blurRad="38100" dist="38100" dir="2700000" algn="tl">
                     <a:srgbClr val="000000">
@@ -2659,16 +2631,6 @@
               </a:rPr>
               <a:t>{</a:t>
             </a:r>
-            <a:endParaRPr lang="en-US" sz="8000" dirty="0">
-              <a:effectLst>
-                <a:outerShdw blurRad="38100" dist="38100" dir="2700000" algn="tl">
-                  <a:srgbClr val="000000">
-                    <a:alpha val="43137"/>
-                  </a:srgbClr>
-                </a:outerShdw>
-              </a:effectLst>
-              <a:latin typeface="+mn-lt"/>
-            </a:endParaRPr>
           </a:p>
         </p:txBody>
       </p:sp>
@@ -2722,35 +2684,35 @@
           <a:p>
             <a:pPr lvl="0"/>
             <a:r>
-              <a:rPr lang="en-US" smtClean="0"/>
+              <a:rPr lang="en-US"/>
               <a:t>Click to edit Master text styles</a:t>
             </a:r>
           </a:p>
           <a:p>
             <a:pPr lvl="1"/>
             <a:r>
-              <a:rPr lang="en-US" smtClean="0"/>
+              <a:rPr lang="en-US"/>
               <a:t>Second level</a:t>
             </a:r>
           </a:p>
           <a:p>
             <a:pPr lvl="2"/>
             <a:r>
-              <a:rPr lang="en-US" smtClean="0"/>
+              <a:rPr lang="en-US"/>
               <a:t>Third level</a:t>
             </a:r>
           </a:p>
           <a:p>
             <a:pPr lvl="3"/>
             <a:r>
-              <a:rPr lang="en-US" smtClean="0"/>
+              <a:rPr lang="en-US"/>
               <a:t>Fourth level</a:t>
             </a:r>
           </a:p>
           <a:p>
             <a:pPr lvl="4"/>
             <a:r>
-              <a:rPr lang="en-US" smtClean="0"/>
+              <a:rPr lang="en-US"/>
               <a:t>Fifth level</a:t>
             </a:r>
             <a:endParaRPr lang="en-US" dirty="0"/>
@@ -2818,7 +2780,7 @@
           <a:p>
             <a:pPr lvl="0"/>
             <a:r>
-              <a:rPr lang="en-US" smtClean="0"/>
+              <a:rPr lang="en-US"/>
               <a:t>Click to edit Master text styles</a:t>
             </a:r>
           </a:p>
@@ -2841,7 +2803,7 @@
           <a:p>
             <a:fld id="{1A12113B-8394-4290-9C68-DD7F4657B786}" type="datetimeFigureOut">
               <a:rPr lang="en-US" smtClean="0"/>
-              <a:t>11/19/2022</a:t>
+              <a:t>11/21/2022</a:t>
             </a:fld>
             <a:endParaRPr lang="en-US"/>
           </a:p>
@@ -2905,7 +2867,7 @@
           <a:lstStyle/>
           <a:p>
             <a:r>
-              <a:rPr lang="en-US" smtClean="0"/>
+              <a:rPr lang="en-US"/>
               <a:t>Click to edit Master title style</a:t>
             </a:r>
             <a:endParaRPr lang="en-US" dirty="0"/>
@@ -3002,10 +2964,9 @@
           </a:lstStyle>
           <a:p>
             <a:r>
-              <a:rPr lang="en-US" smtClean="0"/>
+              <a:rPr lang="en-US"/>
               <a:t>Click icon to add picture</a:t>
             </a:r>
-            <a:endParaRPr lang="en-US"/>
           </a:p>
         </p:txBody>
       </p:sp>
@@ -3070,7 +3031,7 @@
           <a:p>
             <a:pPr lvl="0"/>
             <a:r>
-              <a:rPr lang="en-US" smtClean="0"/>
+              <a:rPr lang="en-US"/>
               <a:t>Click to edit Master text styles</a:t>
             </a:r>
           </a:p>
@@ -3099,7 +3060,7 @@
           <a:lstStyle/>
           <a:p>
             <a:r>
-              <a:rPr lang="en-US" sz="6000" dirty="0" smtClean="0">
+              <a:rPr lang="en-US" sz="6000" dirty="0">
                 <a:effectLst>
                   <a:outerShdw blurRad="38100" dist="38100" dir="2700000" algn="tl">
                     <a:srgbClr val="000000">
@@ -3111,16 +3072,6 @@
               </a:rPr>
               <a:t>{</a:t>
             </a:r>
-            <a:endParaRPr lang="en-US" sz="6000" dirty="0">
-              <a:effectLst>
-                <a:outerShdw blurRad="38100" dist="38100" dir="2700000" algn="tl">
-                  <a:srgbClr val="000000">
-                    <a:alpha val="43137"/>
-                  </a:srgbClr>
-                </a:outerShdw>
-              </a:effectLst>
-              <a:latin typeface="+mn-lt"/>
-            </a:endParaRPr>
           </a:p>
         </p:txBody>
       </p:sp>
@@ -3140,10 +3091,9 @@
           <a:lstStyle/>
           <a:p>
             <a:r>
-              <a:rPr lang="en-US" smtClean="0"/>
+              <a:rPr lang="en-US"/>
               <a:t>Click to edit Master title style</a:t>
             </a:r>
-            <a:endParaRPr lang="en-US"/>
           </a:p>
         </p:txBody>
       </p:sp>
@@ -3164,7 +3114,7 @@
           <a:p>
             <a:fld id="{1A12113B-8394-4290-9C68-DD7F4657B786}" type="datetimeFigureOut">
               <a:rPr lang="en-US" smtClean="0"/>
-              <a:t>11/19/2022</a:t>
+              <a:t>11/21/2022</a:t>
             </a:fld>
             <a:endParaRPr lang="en-US"/>
           </a:p>
@@ -3516,7 +3466,7 @@
           <a:lstStyle/>
           <a:p>
             <a:r>
-              <a:rPr lang="en-US" smtClean="0"/>
+              <a:rPr lang="en-US"/>
               <a:t>Click to edit Master title style</a:t>
             </a:r>
             <a:endParaRPr lang="en-US" dirty="0"/>
@@ -3550,35 +3500,35 @@
           <a:p>
             <a:pPr lvl="0"/>
             <a:r>
-              <a:rPr lang="en-US" smtClean="0"/>
+              <a:rPr lang="en-US"/>
               <a:t>Click to edit Master text styles</a:t>
             </a:r>
           </a:p>
           <a:p>
             <a:pPr lvl="1"/>
             <a:r>
-              <a:rPr lang="en-US" smtClean="0"/>
+              <a:rPr lang="en-US"/>
               <a:t>Second level</a:t>
             </a:r>
           </a:p>
           <a:p>
             <a:pPr lvl="2"/>
             <a:r>
-              <a:rPr lang="en-US" smtClean="0"/>
+              <a:rPr lang="en-US"/>
               <a:t>Third level</a:t>
             </a:r>
           </a:p>
           <a:p>
             <a:pPr lvl="3"/>
             <a:r>
-              <a:rPr lang="en-US" smtClean="0"/>
+              <a:rPr lang="en-US"/>
               <a:t>Fourth level</a:t>
             </a:r>
           </a:p>
           <a:p>
             <a:pPr lvl="4"/>
             <a:r>
-              <a:rPr lang="en-US" smtClean="0"/>
+              <a:rPr lang="en-US"/>
               <a:t>Fifth level</a:t>
             </a:r>
             <a:endParaRPr lang="en-US" dirty="0"/>
@@ -3621,7 +3571,7 @@
           <a:p>
             <a:fld id="{1A12113B-8394-4290-9C68-DD7F4657B786}" type="datetimeFigureOut">
               <a:rPr lang="en-US" smtClean="0"/>
-              <a:t>11/19/2022</a:t>
+              <a:t>11/21/2022</a:t>
             </a:fld>
             <a:endParaRPr lang="en-US"/>
           </a:p>
@@ -4157,7 +4107,7 @@
               <a:buNone/>
             </a:pPr>
             <a:r>
-              <a:rPr lang="en-US" sz="3200" b="1" dirty="0" smtClean="0">
+              <a:rPr lang="en-US" sz="3200" b="1" dirty="0">
                 <a:latin typeface="Cambria" panose="02040503050406030204" pitchFamily="18" charset="0"/>
                 <a:ea typeface="Cambria" panose="02040503050406030204" pitchFamily="18" charset="0"/>
                 <a:cs typeface="Times New Roman" panose="02020603050405020304" pitchFamily="18" charset="0"/>
@@ -4170,7 +4120,7 @@
               <a:buNone/>
             </a:pPr>
             <a:r>
-              <a:rPr lang="en-US" sz="3200" b="1" dirty="0" smtClean="0">
+              <a:rPr lang="en-US" sz="3200" b="1" dirty="0">
                 <a:latin typeface="Cambria" panose="02040503050406030204" pitchFamily="18" charset="0"/>
                 <a:ea typeface="Cambria" panose="02040503050406030204" pitchFamily="18" charset="0"/>
                 <a:cs typeface="Times New Roman" panose="02020603050405020304" pitchFamily="18" charset="0"/>
@@ -4435,7 +4385,7 @@
           </a:lstStyle>
           <a:p>
             <a:r>
-              <a:rPr lang="en-US" dirty="0" smtClean="0">
+              <a:rPr lang="en-US" dirty="0">
                 <a:solidFill>
                   <a:schemeClr val="tx1"/>
                 </a:solidFill>
@@ -4448,7 +4398,7 @@
           </a:p>
           <a:p>
             <a:r>
-              <a:rPr lang="en-US" dirty="0" smtClean="0">
+              <a:rPr lang="en-US" dirty="0">
                 <a:solidFill>
                   <a:schemeClr val="tx1"/>
                 </a:solidFill>
@@ -4458,14 +4408,6 @@
               </a:rPr>
               <a:t>Back End : MYSQL</a:t>
             </a:r>
-            <a:endParaRPr lang="en-US" dirty="0">
-              <a:solidFill>
-                <a:schemeClr val="tx1"/>
-              </a:solidFill>
-              <a:latin typeface="Cambria" panose="02040503050406030204" pitchFamily="18" charset="0"/>
-              <a:ea typeface="Cambria" panose="02040503050406030204" pitchFamily="18" charset="0"/>
-              <a:cs typeface="Times New Roman" panose="02020603050405020304" pitchFamily="18" charset="0"/>
-            </a:endParaRPr>
           </a:p>
         </p:txBody>
       </p:sp>
@@ -4725,7 +4667,7 @@
           <a:p>
             <a:pPr algn="r"/>
             <a:r>
-              <a:rPr lang="en-US" sz="2000" b="1" dirty="0" smtClean="0">
+              <a:rPr lang="en-US" sz="2000" b="1" dirty="0">
                 <a:solidFill>
                   <a:schemeClr val="tx1"/>
                 </a:solidFill>
@@ -4736,7 +4678,7 @@
               <a:t>M </a:t>
             </a:r>
             <a:r>
-              <a:rPr lang="en-US" sz="2000" b="1" dirty="0" err="1" smtClean="0">
+              <a:rPr lang="en-US" sz="2000" b="1" dirty="0" err="1">
                 <a:solidFill>
                   <a:schemeClr val="tx1"/>
                 </a:solidFill>
@@ -4747,7 +4689,7 @@
               <a:t>Sriharish</a:t>
             </a:r>
             <a:r>
-              <a:rPr lang="en-US" sz="2000" b="1" dirty="0" smtClean="0">
+              <a:rPr lang="en-US" sz="2000" b="1" dirty="0">
                 <a:solidFill>
                   <a:schemeClr val="tx1"/>
                 </a:solidFill>
@@ -4761,7 +4703,7 @@
           <a:p>
             <a:pPr algn="r"/>
             <a:r>
-              <a:rPr lang="en-US" sz="2000" b="1" dirty="0" smtClean="0">
+              <a:rPr lang="en-US" sz="2000" b="1" dirty="0">
                 <a:solidFill>
                   <a:schemeClr val="tx1"/>
                 </a:solidFill>
@@ -4772,7 +4714,7 @@
               <a:t>A </a:t>
             </a:r>
             <a:r>
-              <a:rPr lang="en-US" sz="2000" b="1" dirty="0" err="1" smtClean="0">
+              <a:rPr lang="en-US" sz="2000" b="1" dirty="0" err="1">
                 <a:solidFill>
                   <a:schemeClr val="tx1"/>
                 </a:solidFill>
@@ -4783,7 +4725,7 @@
               <a:t>Hepsy</a:t>
             </a:r>
             <a:r>
-              <a:rPr lang="en-US" sz="2000" b="1" dirty="0" smtClean="0">
+              <a:rPr lang="en-US" sz="2000" b="1" dirty="0">
                 <a:solidFill>
                   <a:schemeClr val="tx1"/>
                 </a:solidFill>
@@ -4794,7 +4736,7 @@
               <a:t> </a:t>
             </a:r>
             <a:r>
-              <a:rPr lang="en-US" sz="2000" b="1" dirty="0" err="1" smtClean="0">
+              <a:rPr lang="en-US" sz="2000" b="1" dirty="0" err="1">
                 <a:solidFill>
                   <a:schemeClr val="tx1"/>
                 </a:solidFill>
@@ -4805,7 +4747,7 @@
               <a:t>Joannah</a:t>
             </a:r>
             <a:r>
-              <a:rPr lang="en-US" sz="2000" b="1" dirty="0" smtClean="0">
+              <a:rPr lang="en-US" sz="2000" b="1" dirty="0">
                 <a:solidFill>
                   <a:schemeClr val="tx1"/>
                 </a:solidFill>
@@ -4819,7 +4761,7 @@
           <a:p>
             <a:pPr algn="r"/>
             <a:r>
-              <a:rPr lang="en-US" sz="2000" b="1" dirty="0" smtClean="0">
+              <a:rPr lang="en-US" sz="2000" b="1" dirty="0">
                 <a:solidFill>
                   <a:schemeClr val="tx1"/>
                 </a:solidFill>
@@ -4830,7 +4772,7 @@
               <a:t>S </a:t>
             </a:r>
             <a:r>
-              <a:rPr lang="en-US" sz="2000" b="1" dirty="0" err="1" smtClean="0">
+              <a:rPr lang="en-US" sz="2000" b="1" dirty="0" err="1">
                 <a:solidFill>
                   <a:schemeClr val="tx1"/>
                 </a:solidFill>
@@ -4841,7 +4783,7 @@
               <a:t>Sangeetha</a:t>
             </a:r>
             <a:r>
-              <a:rPr lang="en-US" sz="2000" b="1" dirty="0" smtClean="0">
+              <a:rPr lang="en-US" sz="2000" b="1" dirty="0">
                 <a:solidFill>
                   <a:schemeClr val="tx1"/>
                 </a:solidFill>
@@ -4871,13 +4813,6 @@
       </p:transition>
     </mc:Fallback>
   </mc:AlternateContent>
-  <p:timing>
-    <p:tnLst>
-      <p:par>
-        <p:cTn id="1" dur="indefinite" restart="never" nodeType="tmRoot"/>
-      </p:par>
-    </p:tnLst>
-  </p:timing>
 </p:sld>
 </file>
 
@@ -4924,7 +4859,7 @@
               <a:buNone/>
             </a:pPr>
             <a:r>
-              <a:rPr lang="en-US" sz="2800" b="1" dirty="0" smtClean="0">
+              <a:rPr lang="en-US" sz="2800" b="1" dirty="0">
                 <a:solidFill>
                   <a:schemeClr val="tx1"/>
                 </a:solidFill>
@@ -4933,13 +4868,6 @@
               </a:rPr>
               <a:t>SUBJECT MODULE</a:t>
             </a:r>
-            <a:endParaRPr lang="en-US" sz="2800" b="1" dirty="0">
-              <a:solidFill>
-                <a:schemeClr val="tx1"/>
-              </a:solidFill>
-              <a:latin typeface="Times New Roman" panose="02020603050405020304" pitchFamily="18" charset="0"/>
-              <a:cs typeface="Times New Roman" panose="02020603050405020304" pitchFamily="18" charset="0"/>
-            </a:endParaRPr>
           </a:p>
         </p:txBody>
       </p:sp>
@@ -4973,19 +4901,8 @@
                 <a:latin typeface="Times New Roman" panose="02020603050405020304" pitchFamily="18" charset="0"/>
                 <a:cs typeface="Times New Roman" panose="02020603050405020304" pitchFamily="18" charset="0"/>
               </a:rPr>
-              <a:t>Subjects can be deleted or added by the </a:t>
-            </a:r>
-            <a:r>
-              <a:rPr lang="en-US" sz="2000" dirty="0" smtClean="0">
-                <a:latin typeface="Times New Roman" panose="02020603050405020304" pitchFamily="18" charset="0"/>
-                <a:cs typeface="Times New Roman" panose="02020603050405020304" pitchFamily="18" charset="0"/>
-              </a:rPr>
-              <a:t>instructor</a:t>
-            </a:r>
-            <a:endParaRPr lang="en-US" sz="2000" dirty="0">
-              <a:latin typeface="Times New Roman" panose="02020603050405020304" pitchFamily="18" charset="0"/>
-              <a:cs typeface="Times New Roman" panose="02020603050405020304" pitchFamily="18" charset="0"/>
-            </a:endParaRPr>
+              <a:t>Subjects can be deleted or added by the instructor</a:t>
+            </a:r>
           </a:p>
           <a:p>
             <a:pPr marL="342900" indent="-342900">
@@ -5007,14 +4924,7 @@
                 <a:latin typeface="Times New Roman" panose="02020603050405020304" pitchFamily="18" charset="0"/>
                 <a:cs typeface="Times New Roman" panose="02020603050405020304" pitchFamily="18" charset="0"/>
               </a:rPr>
-              <a:t>The students in the respective department are automatically updated with the new or modified subjects when instructors add or delete </a:t>
-            </a:r>
-            <a:r>
-              <a:rPr lang="en-US" sz="2000" dirty="0" smtClean="0">
-                <a:latin typeface="Times New Roman" panose="02020603050405020304" pitchFamily="18" charset="0"/>
-                <a:cs typeface="Times New Roman" panose="02020603050405020304" pitchFamily="18" charset="0"/>
-              </a:rPr>
-              <a:t>subjects</a:t>
+              <a:t>The students in the respective department are automatically updated with the new or modified subjects when instructors add or delete subjects</a:t>
             </a:r>
           </a:p>
           <a:p>
@@ -5298,18 +5208,13 @@
               <a:buNone/>
             </a:pPr>
             <a:r>
-              <a:rPr lang="en-US" sz="2000" b="1" dirty="0" smtClean="0">
+              <a:rPr lang="en-US" sz="2000" b="1" dirty="0">
                 <a:effectLst/>
                 <a:latin typeface="Times New Roman" panose="02020603050405020304" pitchFamily="18" charset="0"/>
                 <a:cs typeface="Times New Roman" panose="02020603050405020304" pitchFamily="18" charset="0"/>
               </a:rPr>
               <a:t>Instructor subject creation</a:t>
             </a:r>
-            <a:endParaRPr lang="en-US" sz="2000" b="1" dirty="0">
-              <a:effectLst/>
-              <a:latin typeface="Times New Roman" panose="02020603050405020304" pitchFamily="18" charset="0"/>
-              <a:cs typeface="Times New Roman" panose="02020603050405020304" pitchFamily="18" charset="0"/>
-            </a:endParaRPr>
           </a:p>
         </p:txBody>
       </p:sp>
@@ -5552,18 +5457,13 @@
               <a:buNone/>
             </a:pPr>
             <a:r>
-              <a:rPr lang="en-US" sz="2000" b="1" dirty="0" smtClean="0">
+              <a:rPr lang="en-US" sz="2000" b="1" dirty="0">
                 <a:effectLst/>
                 <a:latin typeface="Times New Roman" panose="02020603050405020304" pitchFamily="18" charset="0"/>
                 <a:cs typeface="Times New Roman" panose="02020603050405020304" pitchFamily="18" charset="0"/>
               </a:rPr>
               <a:t>Student subject view</a:t>
             </a:r>
-            <a:endParaRPr lang="en-US" sz="2000" b="1" dirty="0">
-              <a:effectLst/>
-              <a:latin typeface="Times New Roman" panose="02020603050405020304" pitchFamily="18" charset="0"/>
-              <a:cs typeface="Times New Roman" panose="02020603050405020304" pitchFamily="18" charset="0"/>
-            </a:endParaRPr>
           </a:p>
         </p:txBody>
       </p:sp>
@@ -5614,13 +5514,6 @@
       </p:transition>
     </mc:Fallback>
   </mc:AlternateContent>
-  <p:timing>
-    <p:tnLst>
-      <p:par>
-        <p:cTn id="1" dur="indefinite" restart="never" nodeType="tmRoot"/>
-      </p:par>
-    </p:tnLst>
-  </p:timing>
 </p:sld>
 </file>
 
@@ -5910,7 +5803,7 @@
               <a:buNone/>
             </a:pPr>
             <a:r>
-              <a:rPr lang="en-US" sz="2800" b="1" dirty="0" smtClean="0">
+              <a:rPr lang="en-US" sz="2800" b="1" dirty="0">
                 <a:solidFill>
                   <a:schemeClr val="tx1"/>
                 </a:solidFill>
@@ -5919,13 +5812,6 @@
               </a:rPr>
               <a:t>EXAM MODULE</a:t>
             </a:r>
-            <a:endParaRPr lang="en-US" sz="2800" b="1" dirty="0">
-              <a:solidFill>
-                <a:schemeClr val="tx1"/>
-              </a:solidFill>
-              <a:latin typeface="Times New Roman" panose="02020603050405020304" pitchFamily="18" charset="0"/>
-              <a:cs typeface="Times New Roman" panose="02020603050405020304" pitchFamily="18" charset="0"/>
-            </a:endParaRPr>
           </a:p>
         </p:txBody>
       </p:sp>
@@ -5991,45 +5877,8 @@
                 <a:latin typeface="Times New Roman" panose="02020603050405020304" pitchFamily="18" charset="0"/>
                 <a:cs typeface="Times New Roman" panose="02020603050405020304" pitchFamily="18" charset="0"/>
               </a:rPr>
-              <a:t> Information about exams is automatically updated to the students </a:t>
-            </a:r>
-            <a:r>
-              <a:rPr lang="en-US" sz="2000" dirty="0" smtClean="0">
-                <a:solidFill>
-                  <a:schemeClr val="tx1"/>
-                </a:solidFill>
-                <a:latin typeface="Times New Roman" panose="02020603050405020304" pitchFamily="18" charset="0"/>
-                <a:cs typeface="Times New Roman" panose="02020603050405020304" pitchFamily="18" charset="0"/>
-              </a:rPr>
-              <a:t>  in </a:t>
-            </a:r>
-            <a:r>
-              <a:rPr lang="en-US" sz="2000" dirty="0">
-                <a:solidFill>
-                  <a:schemeClr val="tx1"/>
-                </a:solidFill>
-                <a:latin typeface="Times New Roman" panose="02020603050405020304" pitchFamily="18" charset="0"/>
-                <a:cs typeface="Times New Roman" panose="02020603050405020304" pitchFamily="18" charset="0"/>
-              </a:rPr>
-              <a:t>the relevant </a:t>
-            </a:r>
-            <a:r>
-              <a:rPr lang="en-US" sz="2000" dirty="0" smtClean="0">
-                <a:solidFill>
-                  <a:schemeClr val="tx1"/>
-                </a:solidFill>
-                <a:latin typeface="Times New Roman" panose="02020603050405020304" pitchFamily="18" charset="0"/>
-                <a:cs typeface="Times New Roman" panose="02020603050405020304" pitchFamily="18" charset="0"/>
-              </a:rPr>
-              <a:t>department</a:t>
-            </a:r>
-            <a:endParaRPr lang="en-US" sz="2000" dirty="0">
-              <a:solidFill>
-                <a:schemeClr val="tx1"/>
-              </a:solidFill>
-              <a:latin typeface="Times New Roman" panose="02020603050405020304" pitchFamily="18" charset="0"/>
-              <a:cs typeface="Times New Roman" panose="02020603050405020304" pitchFamily="18" charset="0"/>
-            </a:endParaRPr>
+              <a:t> Information about exams is automatically updated to the students   in the relevant department</a:t>
+            </a:r>
           </a:p>
           <a:p>
             <a:pPr marL="342900" indent="-342900">
@@ -6057,25 +5906,8 @@
                 <a:latin typeface="Times New Roman" panose="02020603050405020304" pitchFamily="18" charset="0"/>
                 <a:cs typeface="Times New Roman" panose="02020603050405020304" pitchFamily="18" charset="0"/>
               </a:rPr>
-              <a:t>Exams are only available to students for a limited period of </a:t>
-            </a:r>
-            <a:r>
-              <a:rPr lang="en-US" sz="2000" dirty="0" smtClean="0">
-                <a:solidFill>
-                  <a:schemeClr val="tx1"/>
-                </a:solidFill>
-                <a:latin typeface="Times New Roman" panose="02020603050405020304" pitchFamily="18" charset="0"/>
-                <a:cs typeface="Times New Roman" panose="02020603050405020304" pitchFamily="18" charset="0"/>
-              </a:rPr>
-              <a:t>time</a:t>
-            </a:r>
-            <a:endParaRPr lang="en-US" sz="2000" dirty="0">
-              <a:solidFill>
-                <a:schemeClr val="tx1"/>
-              </a:solidFill>
-              <a:latin typeface="Times New Roman" panose="02020603050405020304" pitchFamily="18" charset="0"/>
-              <a:cs typeface="Times New Roman" panose="02020603050405020304" pitchFamily="18" charset="0"/>
-            </a:endParaRPr>
+              <a:t>Exams are only available to students for a limited period of time</a:t>
+            </a:r>
           </a:p>
           <a:p>
             <a:pPr marL="342900" indent="-342900">
@@ -6103,25 +5935,8 @@
                 <a:latin typeface="Times New Roman" panose="02020603050405020304" pitchFamily="18" charset="0"/>
                 <a:cs typeface="Times New Roman" panose="02020603050405020304" pitchFamily="18" charset="0"/>
               </a:rPr>
-              <a:t>Before the exams, students should follow all </a:t>
-            </a:r>
-            <a:r>
-              <a:rPr lang="en-US" sz="2000" dirty="0" smtClean="0">
-                <a:solidFill>
-                  <a:schemeClr val="tx1"/>
-                </a:solidFill>
-                <a:latin typeface="Times New Roman" panose="02020603050405020304" pitchFamily="18" charset="0"/>
-                <a:cs typeface="Times New Roman" panose="02020603050405020304" pitchFamily="18" charset="0"/>
-              </a:rPr>
-              <a:t>guidelines</a:t>
-            </a:r>
-            <a:endParaRPr lang="en-US" sz="2000" dirty="0">
-              <a:solidFill>
-                <a:schemeClr val="tx1"/>
-              </a:solidFill>
-              <a:latin typeface="Times New Roman" panose="02020603050405020304" pitchFamily="18" charset="0"/>
-              <a:cs typeface="Times New Roman" panose="02020603050405020304" pitchFamily="18" charset="0"/>
-            </a:endParaRPr>
+              <a:t>Before the exams, students should follow all guidelines</a:t>
+            </a:r>
           </a:p>
           <a:p>
             <a:pPr marL="342900" indent="-342900">
@@ -6162,17 +5977,348 @@
   <p:transition spd="slow">
     <p:wheel spokes="1"/>
   </p:transition>
-  <p:timing>
-    <p:tnLst>
-      <p:par>
-        <p:cTn id="1" dur="indefinite" restart="never" nodeType="tmRoot"/>
-      </p:par>
-    </p:tnLst>
-  </p:timing>
 </p:sld>
 </file>
 
 <file path=ppt/slides/slide12.xml><?xml version="1.0" encoding="utf-8"?>
+<p:sld xmlns:a="http://schemas.openxmlformats.org/drawingml/2006/main" xmlns:r="http://schemas.openxmlformats.org/officeDocument/2006/relationships" xmlns:p="http://schemas.openxmlformats.org/presentationml/2006/main">
+  <p:cSld>
+    <p:spTree>
+      <p:nvGrpSpPr>
+        <p:cNvPr id="1" name=""/>
+        <p:cNvGrpSpPr/>
+        <p:nvPr/>
+      </p:nvGrpSpPr>
+      <p:grpSpPr>
+        <a:xfrm>
+          <a:off x="0" y="0"/>
+          <a:ext cx="0" cy="0"/>
+          <a:chOff x="0" y="0"/>
+          <a:chExt cx="0" cy="0"/>
+        </a:xfrm>
+      </p:grpSpPr>
+      <p:sp>
+        <p:nvSpPr>
+          <p:cNvPr id="2" name="Title 1">
+            <a:extLst>
+              <a:ext uri="{FF2B5EF4-FFF2-40B4-BE49-F238E27FC236}">
+                <a16:creationId xmlns:a16="http://schemas.microsoft.com/office/drawing/2014/main" id="{49893232-8127-4969-A1EE-B899FD25F961}"/>
+              </a:ext>
+            </a:extLst>
+          </p:cNvPr>
+          <p:cNvSpPr>
+            <a:spLocks noGrp="1"/>
+          </p:cNvSpPr>
+          <p:nvPr>
+            <p:ph type="title"/>
+          </p:nvPr>
+        </p:nvSpPr>
+        <p:spPr>
+          <a:xfrm>
+            <a:off x="6056243" y="1371600"/>
+            <a:ext cx="2423160" cy="685800"/>
+          </a:xfrm>
+        </p:spPr>
+        <p:txBody>
+          <a:bodyPr/>
+          <a:lstStyle/>
+          <a:p>
+            <a:pPr algn="ctr"/>
+            <a:r>
+              <a:rPr lang="en-US" sz="2000" b="1" dirty="0">
+                <a:latin typeface="Times New Roman" panose="02020603050405020304" pitchFamily="18" charset="0"/>
+                <a:cs typeface="Times New Roman" panose="02020603050405020304" pitchFamily="18" charset="0"/>
+              </a:rPr>
+              <a:t>Exam Management</a:t>
+            </a:r>
+            <a:endParaRPr lang="en-IN" sz="2000" b="1" dirty="0">
+              <a:latin typeface="Times New Roman" panose="02020603050405020304" pitchFamily="18" charset="0"/>
+              <a:cs typeface="Times New Roman" panose="02020603050405020304" pitchFamily="18" charset="0"/>
+            </a:endParaRPr>
+          </a:p>
+        </p:txBody>
+      </p:sp>
+      <p:pic>
+        <p:nvPicPr>
+          <p:cNvPr id="8" name="Picture 7">
+            <a:extLst>
+              <a:ext uri="{FF2B5EF4-FFF2-40B4-BE49-F238E27FC236}">
+                <a16:creationId xmlns:a16="http://schemas.microsoft.com/office/drawing/2014/main" id="{847A7687-3C1E-439B-A61F-CEC3194C9F50}"/>
+              </a:ext>
+            </a:extLst>
+          </p:cNvPr>
+          <p:cNvPicPr>
+            <a:picLocks noChangeAspect="1"/>
+          </p:cNvPicPr>
+          <p:nvPr/>
+        </p:nvPicPr>
+        <p:blipFill rotWithShape="1">
+          <a:blip r:embed="rId2"/>
+          <a:srcRect t="2588"/>
+          <a:stretch/>
+        </p:blipFill>
+        <p:spPr>
+          <a:xfrm>
+            <a:off x="304800" y="304800"/>
+            <a:ext cx="5715000" cy="3124200"/>
+          </a:xfrm>
+          <a:prstGeom prst="rect">
+            <a:avLst/>
+          </a:prstGeom>
+        </p:spPr>
+      </p:pic>
+      <p:sp>
+        <p:nvSpPr>
+          <p:cNvPr id="9" name="TextBox 8">
+            <a:extLst>
+              <a:ext uri="{FF2B5EF4-FFF2-40B4-BE49-F238E27FC236}">
+                <a16:creationId xmlns:a16="http://schemas.microsoft.com/office/drawing/2014/main" id="{5E85C3EF-96FB-4815-A38F-BF39C2709874}"/>
+              </a:ext>
+            </a:extLst>
+          </p:cNvPr>
+          <p:cNvSpPr txBox="1"/>
+          <p:nvPr/>
+        </p:nvSpPr>
+        <p:spPr>
+          <a:xfrm>
+            <a:off x="914400" y="4958834"/>
+            <a:ext cx="3048000" cy="369332"/>
+          </a:xfrm>
+          <a:prstGeom prst="rect">
+            <a:avLst/>
+          </a:prstGeom>
+          <a:noFill/>
+        </p:spPr>
+        <p:txBody>
+          <a:bodyPr wrap="square" rtlCol="0">
+            <a:spAutoFit/>
+          </a:bodyPr>
+          <a:lstStyle/>
+          <a:p>
+            <a:r>
+              <a:rPr lang="en-US" b="1" dirty="0"/>
+              <a:t>Create Exam Form</a:t>
+            </a:r>
+            <a:endParaRPr lang="en-IN" b="1" dirty="0"/>
+          </a:p>
+        </p:txBody>
+      </p:sp>
+      <p:pic>
+        <p:nvPicPr>
+          <p:cNvPr id="13" name="Picture 12">
+            <a:extLst>
+              <a:ext uri="{FF2B5EF4-FFF2-40B4-BE49-F238E27FC236}">
+                <a16:creationId xmlns:a16="http://schemas.microsoft.com/office/drawing/2014/main" id="{B91A9562-B274-43CC-A72A-8B9C246AEFC4}"/>
+              </a:ext>
+            </a:extLst>
+          </p:cNvPr>
+          <p:cNvPicPr>
+            <a:picLocks noChangeAspect="1"/>
+          </p:cNvPicPr>
+          <p:nvPr/>
+        </p:nvPicPr>
+        <p:blipFill>
+          <a:blip r:embed="rId3"/>
+          <a:stretch>
+            <a:fillRect/>
+          </a:stretch>
+        </p:blipFill>
+        <p:spPr>
+          <a:xfrm>
+            <a:off x="3124200" y="3581400"/>
+            <a:ext cx="5715000" cy="3124201"/>
+          </a:xfrm>
+          <a:prstGeom prst="rect">
+            <a:avLst/>
+          </a:prstGeom>
+        </p:spPr>
+      </p:pic>
+    </p:spTree>
+    <p:extLst>
+      <p:ext uri="{BB962C8B-B14F-4D97-AF65-F5344CB8AC3E}">
+        <p14:creationId xmlns:p14="http://schemas.microsoft.com/office/powerpoint/2010/main" val="944336006"/>
+      </p:ext>
+    </p:extLst>
+  </p:cSld>
+  <p:clrMapOvr>
+    <a:masterClrMapping/>
+  </p:clrMapOvr>
+</p:sld>
+</file>
+
+<file path=ppt/slides/slide13.xml><?xml version="1.0" encoding="utf-8"?>
+<p:sld xmlns:a="http://schemas.openxmlformats.org/drawingml/2006/main" xmlns:r="http://schemas.openxmlformats.org/officeDocument/2006/relationships" xmlns:p="http://schemas.openxmlformats.org/presentationml/2006/main">
+  <p:cSld>
+    <p:spTree>
+      <p:nvGrpSpPr>
+        <p:cNvPr id="1" name=""/>
+        <p:cNvGrpSpPr/>
+        <p:nvPr/>
+      </p:nvGrpSpPr>
+      <p:grpSpPr>
+        <a:xfrm>
+          <a:off x="0" y="0"/>
+          <a:ext cx="0" cy="0"/>
+          <a:chOff x="0" y="0"/>
+          <a:chExt cx="0" cy="0"/>
+        </a:xfrm>
+      </p:grpSpPr>
+      <p:sp>
+        <p:nvSpPr>
+          <p:cNvPr id="2" name="Title 1">
+            <a:extLst>
+              <a:ext uri="{FF2B5EF4-FFF2-40B4-BE49-F238E27FC236}">
+                <a16:creationId xmlns:a16="http://schemas.microsoft.com/office/drawing/2014/main" id="{DA1CF198-1BD5-413F-8B22-181AB6E970E4}"/>
+              </a:ext>
+            </a:extLst>
+          </p:cNvPr>
+          <p:cNvSpPr>
+            <a:spLocks noGrp="1"/>
+          </p:cNvSpPr>
+          <p:nvPr>
+            <p:ph type="title"/>
+          </p:nvPr>
+        </p:nvSpPr>
+        <p:spPr>
+          <a:xfrm>
+            <a:off x="6057900" y="1295400"/>
+            <a:ext cx="2743200" cy="609600"/>
+          </a:xfrm>
+        </p:spPr>
+        <p:txBody>
+          <a:bodyPr/>
+          <a:lstStyle/>
+          <a:p>
+            <a:r>
+              <a:rPr lang="en-US" sz="2000" b="1" dirty="0">
+                <a:latin typeface="Times New Roman" panose="02020603050405020304" pitchFamily="18" charset="0"/>
+                <a:cs typeface="Times New Roman" panose="02020603050405020304" pitchFamily="18" charset="0"/>
+              </a:rPr>
+              <a:t>Instructor View Exam</a:t>
+            </a:r>
+            <a:endParaRPr lang="en-IN" sz="2000" b="1" dirty="0">
+              <a:latin typeface="Times New Roman" panose="02020603050405020304" pitchFamily="18" charset="0"/>
+              <a:cs typeface="Times New Roman" panose="02020603050405020304" pitchFamily="18" charset="0"/>
+            </a:endParaRPr>
+          </a:p>
+        </p:txBody>
+      </p:sp>
+      <p:pic>
+        <p:nvPicPr>
+          <p:cNvPr id="4" name="Picture 3">
+            <a:extLst>
+              <a:ext uri="{FF2B5EF4-FFF2-40B4-BE49-F238E27FC236}">
+                <a16:creationId xmlns:a16="http://schemas.microsoft.com/office/drawing/2014/main" id="{D5267432-D556-40C2-944F-E18DAF6C93DA}"/>
+              </a:ext>
+            </a:extLst>
+          </p:cNvPr>
+          <p:cNvPicPr>
+            <a:picLocks noChangeAspect="1"/>
+          </p:cNvPicPr>
+          <p:nvPr/>
+        </p:nvPicPr>
+        <p:blipFill>
+          <a:blip r:embed="rId2"/>
+          <a:stretch>
+            <a:fillRect/>
+          </a:stretch>
+        </p:blipFill>
+        <p:spPr>
+          <a:xfrm>
+            <a:off x="381001" y="228599"/>
+            <a:ext cx="5653563" cy="3124800"/>
+          </a:xfrm>
+          <a:prstGeom prst="rect">
+            <a:avLst/>
+          </a:prstGeom>
+        </p:spPr>
+      </p:pic>
+      <p:pic>
+        <p:nvPicPr>
+          <p:cNvPr id="6" name="Picture 5">
+            <a:extLst>
+              <a:ext uri="{FF2B5EF4-FFF2-40B4-BE49-F238E27FC236}">
+                <a16:creationId xmlns:a16="http://schemas.microsoft.com/office/drawing/2014/main" id="{3BA04BFB-50B6-407E-8003-42AAA17D0CEA}"/>
+              </a:ext>
+            </a:extLst>
+          </p:cNvPr>
+          <p:cNvPicPr>
+            <a:picLocks noChangeAspect="1"/>
+          </p:cNvPicPr>
+          <p:nvPr/>
+        </p:nvPicPr>
+        <p:blipFill>
+          <a:blip r:embed="rId3"/>
+          <a:stretch>
+            <a:fillRect/>
+          </a:stretch>
+        </p:blipFill>
+        <p:spPr>
+          <a:xfrm>
+            <a:off x="3048000" y="3512761"/>
+            <a:ext cx="5768163" cy="3124800"/>
+          </a:xfrm>
+          <a:prstGeom prst="rect">
+            <a:avLst/>
+          </a:prstGeom>
+        </p:spPr>
+      </p:pic>
+      <p:sp>
+        <p:nvSpPr>
+          <p:cNvPr id="7" name="TextBox 6">
+            <a:extLst>
+              <a:ext uri="{FF2B5EF4-FFF2-40B4-BE49-F238E27FC236}">
+                <a16:creationId xmlns:a16="http://schemas.microsoft.com/office/drawing/2014/main" id="{2478CD8F-C765-4C7D-AF56-32966AC84A50}"/>
+              </a:ext>
+            </a:extLst>
+          </p:cNvPr>
+          <p:cNvSpPr txBox="1"/>
+          <p:nvPr/>
+        </p:nvSpPr>
+        <p:spPr>
+          <a:xfrm>
+            <a:off x="514278" y="4875106"/>
+            <a:ext cx="2667000" cy="400110"/>
+          </a:xfrm>
+          <a:prstGeom prst="rect">
+            <a:avLst/>
+          </a:prstGeom>
+          <a:noFill/>
+        </p:spPr>
+        <p:txBody>
+          <a:bodyPr wrap="square" rtlCol="0">
+            <a:spAutoFit/>
+          </a:bodyPr>
+          <a:lstStyle/>
+          <a:p>
+            <a:r>
+              <a:rPr lang="en-US" sz="2000" b="1" dirty="0">
+                <a:latin typeface="Times New Roman" panose="02020603050405020304" pitchFamily="18" charset="0"/>
+                <a:cs typeface="Times New Roman" panose="02020603050405020304" pitchFamily="18" charset="0"/>
+              </a:rPr>
+              <a:t>Students View Exam</a:t>
+            </a:r>
+            <a:endParaRPr lang="en-IN" sz="2000" b="1" dirty="0">
+              <a:latin typeface="Times New Roman" panose="02020603050405020304" pitchFamily="18" charset="0"/>
+              <a:cs typeface="Times New Roman" panose="02020603050405020304" pitchFamily="18" charset="0"/>
+            </a:endParaRPr>
+          </a:p>
+        </p:txBody>
+      </p:sp>
+    </p:spTree>
+    <p:extLst>
+      <p:ext uri="{BB962C8B-B14F-4D97-AF65-F5344CB8AC3E}">
+        <p14:creationId xmlns:p14="http://schemas.microsoft.com/office/powerpoint/2010/main" val="3306058711"/>
+      </p:ext>
+    </p:extLst>
+  </p:cSld>
+  <p:clrMapOvr>
+    <a:masterClrMapping/>
+  </p:clrMapOvr>
+</p:sld>
+</file>
+
+<file path=ppt/slides/slide14.xml><?xml version="1.0" encoding="utf-8"?>
 <p:sld xmlns:a="http://schemas.openxmlformats.org/drawingml/2006/main" xmlns:r="http://schemas.openxmlformats.org/officeDocument/2006/relationships" xmlns:p="http://schemas.openxmlformats.org/presentationml/2006/main">
   <p:cSld>
     <p:spTree>
@@ -6458,18 +6604,13 @@
               <a:buNone/>
             </a:pPr>
             <a:r>
-              <a:rPr lang="en-US" sz="2000" b="1" dirty="0" smtClean="0">
+              <a:rPr lang="en-US" sz="2000" b="1" dirty="0">
                 <a:effectLst/>
                 <a:latin typeface="Times New Roman" panose="02020603050405020304" pitchFamily="18" charset="0"/>
                 <a:cs typeface="Times New Roman" panose="02020603050405020304" pitchFamily="18" charset="0"/>
               </a:rPr>
               <a:t>Exam Guidelines </a:t>
             </a:r>
-            <a:endParaRPr lang="en-US" sz="2000" b="1" dirty="0">
-              <a:effectLst/>
-              <a:latin typeface="Times New Roman" panose="02020603050405020304" pitchFamily="18" charset="0"/>
-              <a:cs typeface="Times New Roman" panose="02020603050405020304" pitchFamily="18" charset="0"/>
-            </a:endParaRPr>
           </a:p>
         </p:txBody>
       </p:sp>
@@ -6742,26 +6883,13 @@
               <a:buNone/>
             </a:pPr>
             <a:r>
-              <a:rPr lang="en-US" sz="2000" b="1" dirty="0" smtClean="0">
+              <a:rPr lang="en-US" sz="2000" b="1" dirty="0">
                 <a:effectLst/>
                 <a:latin typeface="Times New Roman" panose="02020603050405020304" pitchFamily="18" charset="0"/>
                 <a:cs typeface="Times New Roman" panose="02020603050405020304" pitchFamily="18" charset="0"/>
               </a:rPr>
-              <a:t>Exam </a:t>
-            </a:r>
-            <a:r>
-              <a:rPr lang="en-US" sz="2000" b="1" dirty="0" smtClean="0">
-                <a:effectLst/>
-                <a:latin typeface="Times New Roman" panose="02020603050405020304" pitchFamily="18" charset="0"/>
-                <a:cs typeface="Times New Roman" panose="02020603050405020304" pitchFamily="18" charset="0"/>
-              </a:rPr>
-              <a:t>Question</a:t>
-            </a:r>
-            <a:endParaRPr lang="en-US" sz="2000" b="1" dirty="0">
-              <a:effectLst/>
-              <a:latin typeface="Times New Roman" panose="02020603050405020304" pitchFamily="18" charset="0"/>
-              <a:cs typeface="Times New Roman" panose="02020603050405020304" pitchFamily="18" charset="0"/>
-            </a:endParaRPr>
+              <a:t>Exam Question</a:t>
+            </a:r>
           </a:p>
         </p:txBody>
       </p:sp>
@@ -6803,17 +6931,10 @@
   <p:transition spd="slow">
     <p:wheel spokes="1"/>
   </p:transition>
-  <p:timing>
-    <p:tnLst>
-      <p:par>
-        <p:cTn id="1" dur="indefinite" restart="never" nodeType="tmRoot"/>
-      </p:par>
-    </p:tnLst>
-  </p:timing>
 </p:sld>
 </file>
 
-<file path=ppt/slides/slide13.xml><?xml version="1.0" encoding="utf-8"?>
+<file path=ppt/slides/slide15.xml><?xml version="1.0" encoding="utf-8"?>
 <p:sld xmlns:a="http://schemas.openxmlformats.org/drawingml/2006/main" xmlns:r="http://schemas.openxmlformats.org/officeDocument/2006/relationships" xmlns:p="http://schemas.openxmlformats.org/presentationml/2006/main">
   <p:cSld>
     <p:spTree>
@@ -7099,7 +7220,7 @@
               <a:buNone/>
             </a:pPr>
             <a:r>
-              <a:rPr lang="en-US" sz="2800" b="1" dirty="0" smtClean="0">
+              <a:rPr lang="en-US" sz="2800" b="1" dirty="0">
                 <a:solidFill>
                   <a:schemeClr val="tx1"/>
                 </a:solidFill>
@@ -7108,13 +7229,6 @@
               </a:rPr>
               <a:t>RESULT MODULE</a:t>
             </a:r>
-            <a:endParaRPr lang="en-US" sz="2800" b="1" dirty="0">
-              <a:solidFill>
-                <a:schemeClr val="tx1"/>
-              </a:solidFill>
-              <a:latin typeface="Times New Roman" panose="02020603050405020304" pitchFamily="18" charset="0"/>
-              <a:cs typeface="Times New Roman" panose="02020603050405020304" pitchFamily="18" charset="0"/>
-            </a:endParaRPr>
           </a:p>
         </p:txBody>
       </p:sp>
@@ -7178,19 +7292,8 @@
                 <a:latin typeface="Times New Roman" panose="02020603050405020304" pitchFamily="18" charset="0"/>
                 <a:cs typeface="Times New Roman" panose="02020603050405020304" pitchFamily="18" charset="0"/>
               </a:rPr>
-              <a:t>Exams are automatically evaluated, and the results are reported to </a:t>
-            </a:r>
-            <a:r>
-              <a:rPr lang="en-US" sz="2000" dirty="0" smtClean="0">
-                <a:latin typeface="Times New Roman" panose="02020603050405020304" pitchFamily="18" charset="0"/>
-                <a:cs typeface="Times New Roman" panose="02020603050405020304" pitchFamily="18" charset="0"/>
-              </a:rPr>
-              <a:t>admin</a:t>
-            </a:r>
-            <a:endParaRPr lang="en-US" sz="2000" dirty="0">
-              <a:latin typeface="Times New Roman" panose="02020603050405020304" pitchFamily="18" charset="0"/>
-              <a:cs typeface="Times New Roman" panose="02020603050405020304" pitchFamily="18" charset="0"/>
-            </a:endParaRPr>
+              <a:t>Exams are automatically evaluated, and the results are reported to admin</a:t>
+            </a:r>
           </a:p>
           <a:p>
             <a:pPr marL="342900" indent="-342900">
@@ -7212,19 +7315,8 @@
                 <a:latin typeface="Times New Roman" panose="02020603050405020304" pitchFamily="18" charset="0"/>
                 <a:cs typeface="Times New Roman" panose="02020603050405020304" pitchFamily="18" charset="0"/>
               </a:rPr>
-              <a:t> The instructor and students can view the </a:t>
-            </a:r>
-            <a:r>
-              <a:rPr lang="en-US" sz="2000" dirty="0" smtClean="0">
-                <a:latin typeface="Times New Roman" panose="02020603050405020304" pitchFamily="18" charset="0"/>
-                <a:cs typeface="Times New Roman" panose="02020603050405020304" pitchFamily="18" charset="0"/>
-              </a:rPr>
-              <a:t>results</a:t>
-            </a:r>
-            <a:endParaRPr lang="en-US" sz="2000" dirty="0">
-              <a:latin typeface="Times New Roman" panose="02020603050405020304" pitchFamily="18" charset="0"/>
-              <a:cs typeface="Times New Roman" panose="02020603050405020304" pitchFamily="18" charset="0"/>
-            </a:endParaRPr>
+              <a:t> The instructor and students can view the results</a:t>
+            </a:r>
           </a:p>
         </p:txBody>
       </p:sp>
@@ -7497,26 +7589,13 @@
               <a:buNone/>
             </a:pPr>
             <a:r>
-              <a:rPr lang="en-US" sz="2000" b="1" dirty="0" smtClean="0">
+              <a:rPr lang="en-US" sz="2000" b="1" dirty="0">
                 <a:effectLst/>
                 <a:latin typeface="Times New Roman" panose="02020603050405020304" pitchFamily="18" charset="0"/>
                 <a:cs typeface="Times New Roman" panose="02020603050405020304" pitchFamily="18" charset="0"/>
               </a:rPr>
-              <a:t>Student can view Result instantly</a:t>
-            </a:r>
-            <a:r>
-              <a:rPr lang="en-US" sz="2000" b="1" dirty="0" smtClean="0">
-                <a:effectLst/>
-                <a:latin typeface="Times New Roman" panose="02020603050405020304" pitchFamily="18" charset="0"/>
-                <a:cs typeface="Times New Roman" panose="02020603050405020304" pitchFamily="18" charset="0"/>
-              </a:rPr>
-              <a:t> </a:t>
-            </a:r>
-            <a:endParaRPr lang="en-US" sz="2000" b="1" dirty="0">
-              <a:effectLst/>
-              <a:latin typeface="Times New Roman" panose="02020603050405020304" pitchFamily="18" charset="0"/>
-              <a:cs typeface="Times New Roman" panose="02020603050405020304" pitchFamily="18" charset="0"/>
-            </a:endParaRPr>
+              <a:t>Student can view Result instantly </a:t>
+            </a:r>
           </a:p>
         </p:txBody>
       </p:sp>
@@ -8005,26 +8084,13 @@
               <a:buNone/>
             </a:pPr>
             <a:r>
-              <a:rPr lang="en-US" sz="2000" b="1" dirty="0" smtClean="0">
+              <a:rPr lang="en-US" sz="2000" b="1" dirty="0">
                 <a:effectLst/>
                 <a:latin typeface="Times New Roman" panose="02020603050405020304" pitchFamily="18" charset="0"/>
                 <a:cs typeface="Times New Roman" panose="02020603050405020304" pitchFamily="18" charset="0"/>
               </a:rPr>
-              <a:t>Faculty can view student Result instantly</a:t>
-            </a:r>
-            <a:r>
-              <a:rPr lang="en-US" sz="2000" b="1" dirty="0" smtClean="0">
-                <a:effectLst/>
-                <a:latin typeface="Times New Roman" panose="02020603050405020304" pitchFamily="18" charset="0"/>
-                <a:cs typeface="Times New Roman" panose="02020603050405020304" pitchFamily="18" charset="0"/>
-              </a:rPr>
-              <a:t> </a:t>
-            </a:r>
-            <a:endParaRPr lang="en-US" sz="2000" b="1" dirty="0">
-              <a:effectLst/>
-              <a:latin typeface="Times New Roman" panose="02020603050405020304" pitchFamily="18" charset="0"/>
-              <a:cs typeface="Times New Roman" panose="02020603050405020304" pitchFamily="18" charset="0"/>
-            </a:endParaRPr>
+              <a:t>Faculty can view student Result instantly </a:t>
+            </a:r>
           </a:p>
         </p:txBody>
       </p:sp>
@@ -8045,17 +8111,10 @@
       </p:transition>
     </mc:Fallback>
   </mc:AlternateContent>
-  <p:timing>
-    <p:tnLst>
-      <p:par>
-        <p:cTn id="1" dur="indefinite" restart="never" nodeType="tmRoot"/>
-      </p:par>
-    </p:tnLst>
-  </p:timing>
 </p:sld>
 </file>
 
-<file path=ppt/slides/slide14.xml><?xml version="1.0" encoding="utf-8"?>
+<file path=ppt/slides/slide16.xml><?xml version="1.0" encoding="utf-8"?>
 <p:sld xmlns:a="http://schemas.openxmlformats.org/drawingml/2006/main" xmlns:r="http://schemas.openxmlformats.org/officeDocument/2006/relationships" xmlns:p="http://schemas.openxmlformats.org/presentationml/2006/main">
   <p:cSld>
     <p:spTree>
@@ -8341,7 +8400,7 @@
               <a:buNone/>
             </a:pPr>
             <a:r>
-              <a:rPr lang="en-US" sz="2800" b="1" dirty="0" smtClean="0">
+              <a:rPr lang="en-US" sz="2800" b="1" dirty="0">
                 <a:solidFill>
                   <a:schemeClr val="tx1"/>
                 </a:solidFill>
@@ -8350,13 +8409,6 @@
               </a:rPr>
               <a:t>LOGOUT MODULE</a:t>
             </a:r>
-            <a:endParaRPr lang="en-US" sz="2800" b="1" dirty="0">
-              <a:solidFill>
-                <a:schemeClr val="tx1"/>
-              </a:solidFill>
-              <a:latin typeface="Times New Roman" panose="02020603050405020304" pitchFamily="18" charset="0"/>
-              <a:cs typeface="Times New Roman" panose="02020603050405020304" pitchFamily="18" charset="0"/>
-            </a:endParaRPr>
           </a:p>
         </p:txBody>
       </p:sp>
@@ -8413,19 +8465,8 @@
                 <a:latin typeface="Times New Roman" panose="02020603050405020304" pitchFamily="18" charset="0"/>
                 <a:cs typeface="Times New Roman" panose="02020603050405020304" pitchFamily="18" charset="0"/>
               </a:rPr>
-              <a:t>     your </a:t>
-            </a:r>
-            <a:r>
-              <a:rPr lang="en-US" sz="2000" dirty="0" smtClean="0">
-                <a:latin typeface="Times New Roman" panose="02020603050405020304" pitchFamily="18" charset="0"/>
-                <a:cs typeface="Times New Roman" panose="02020603050405020304" pitchFamily="18" charset="0"/>
-              </a:rPr>
-              <a:t>data</a:t>
-            </a:r>
-            <a:endParaRPr lang="en-US" sz="2000" dirty="0">
-              <a:latin typeface="Times New Roman" panose="02020603050405020304" pitchFamily="18" charset="0"/>
-              <a:cs typeface="Times New Roman" panose="02020603050405020304" pitchFamily="18" charset="0"/>
-            </a:endParaRPr>
+              <a:t>     your data</a:t>
+            </a:r>
           </a:p>
           <a:p>
             <a:pPr marL="342900" indent="-342900">
@@ -8460,19 +8501,8 @@
                 <a:latin typeface="Times New Roman" panose="02020603050405020304" pitchFamily="18" charset="0"/>
                 <a:cs typeface="Times New Roman" panose="02020603050405020304" pitchFamily="18" charset="0"/>
               </a:rPr>
-              <a:t>     this logout </a:t>
-            </a:r>
-            <a:r>
-              <a:rPr lang="en-US" sz="2000" dirty="0" smtClean="0">
-                <a:latin typeface="Times New Roman" panose="02020603050405020304" pitchFamily="18" charset="0"/>
-                <a:cs typeface="Times New Roman" panose="02020603050405020304" pitchFamily="18" charset="0"/>
-              </a:rPr>
-              <a:t>option</a:t>
-            </a:r>
-            <a:endParaRPr lang="en-US" sz="2000" dirty="0">
-              <a:latin typeface="Times New Roman" panose="02020603050405020304" pitchFamily="18" charset="0"/>
-              <a:cs typeface="Times New Roman" panose="02020603050405020304" pitchFamily="18" charset="0"/>
-            </a:endParaRPr>
+              <a:t>     this logout option</a:t>
+            </a:r>
           </a:p>
           <a:p>
             <a:pPr marL="342900" indent="-342900">
@@ -8520,15 +8550,7 @@
                 <a:cs typeface="Times New Roman" panose="02020603050405020304" pitchFamily="18" charset="0"/>
                 <a:sym typeface="+mn-ea"/>
               </a:rPr>
-              <a:t>Logout widgets, which will subsequently send to a login </a:t>
-            </a:r>
-            <a:r>
-              <a:rPr lang="en-US" sz="2000" dirty="0" smtClean="0">
-                <a:latin typeface="Times New Roman" panose="02020603050405020304" pitchFamily="18" charset="0"/>
-                <a:cs typeface="Times New Roman" panose="02020603050405020304" pitchFamily="18" charset="0"/>
-                <a:sym typeface="+mn-ea"/>
-              </a:rPr>
-              <a:t>page</a:t>
+              <a:t>Logout widgets, which will subsequently send to a login page</a:t>
             </a:r>
             <a:endParaRPr lang="en-US" sz="2000" dirty="0">
               <a:latin typeface="Times New Roman" panose="02020603050405020304" pitchFamily="18" charset="0"/>
@@ -8598,17 +8620,10 @@
       </p:transition>
     </mc:Fallback>
   </mc:AlternateContent>
-  <p:timing>
-    <p:tnLst>
-      <p:par>
-        <p:cTn id="1" dur="indefinite" restart="never" nodeType="tmRoot"/>
-      </p:par>
-    </p:tnLst>
-  </p:timing>
 </p:sld>
 </file>
 
-<file path=ppt/slides/slide15.xml><?xml version="1.0" encoding="utf-8"?>
+<file path=ppt/slides/slide17.xml><?xml version="1.0" encoding="utf-8"?>
 <p:sld xmlns:a="http://schemas.openxmlformats.org/drawingml/2006/main" xmlns:r="http://schemas.openxmlformats.org/officeDocument/2006/relationships" xmlns:p="http://schemas.openxmlformats.org/presentationml/2006/main">
   <p:cSld>
     <p:spTree>
@@ -8864,7 +8879,7 @@
               <a:buNone/>
             </a:pPr>
             <a:r>
-              <a:rPr lang="en-US" sz="2800" b="1" dirty="0" smtClean="0">
+              <a:rPr lang="en-US" sz="2800" b="1" dirty="0">
                 <a:latin typeface="Times New Roman" panose="02020603050405020304" pitchFamily="18" charset="0"/>
                 <a:cs typeface="Times New Roman" panose="02020603050405020304" pitchFamily="18" charset="0"/>
               </a:rPr>
@@ -8903,7 +8918,7 @@
               <a:buChar char="•"/>
             </a:pPr>
             <a:r>
-              <a:rPr lang="en-US" sz="2000" dirty="0" smtClean="0">
+              <a:rPr lang="en-US" sz="2000" dirty="0">
                 <a:latin typeface="Times New Roman" panose="02020603050405020304" pitchFamily="18" charset="0"/>
                 <a:cs typeface="Times New Roman" panose="02020603050405020304" pitchFamily="18" charset="0"/>
                 <a:sym typeface="+mn-ea"/>
@@ -8916,7 +8931,7 @@
               <a:buFont typeface="Arial" panose="020B0604020202020204" pitchFamily="34" charset="0"/>
               <a:buChar char="•"/>
             </a:pPr>
-            <a:endParaRPr lang="en-US" sz="2000" dirty="0" smtClean="0">
+            <a:endParaRPr lang="en-US" sz="2000" dirty="0">
               <a:latin typeface="Times New Roman" panose="02020603050405020304" pitchFamily="18" charset="0"/>
               <a:cs typeface="Times New Roman" panose="02020603050405020304" pitchFamily="18" charset="0"/>
               <a:sym typeface="+mn-ea"/>
@@ -8928,7 +8943,7 @@
               <a:buChar char="•"/>
             </a:pPr>
             <a:r>
-              <a:rPr lang="en-US" sz="2000" dirty="0" smtClean="0">
+              <a:rPr lang="en-US" sz="2000" dirty="0">
                 <a:latin typeface="Times New Roman" panose="02020603050405020304" pitchFamily="18" charset="0"/>
                 <a:cs typeface="Times New Roman" panose="02020603050405020304" pitchFamily="18" charset="0"/>
                 <a:sym typeface="+mn-ea"/>
@@ -8937,7 +8952,7 @@
             </a:r>
           </a:p>
           <a:p>
-            <a:endParaRPr lang="en-US" sz="2000" dirty="0" smtClean="0">
+            <a:endParaRPr lang="en-US" sz="2000" dirty="0">
               <a:latin typeface="Times New Roman" panose="02020603050405020304" pitchFamily="18" charset="0"/>
               <a:cs typeface="Times New Roman" panose="02020603050405020304" pitchFamily="18" charset="0"/>
               <a:sym typeface="+mn-ea"/>
@@ -8949,7 +8964,7 @@
               <a:buChar char="•"/>
             </a:pPr>
             <a:r>
-              <a:rPr lang="en-US" sz="2000" dirty="0" smtClean="0">
+              <a:rPr lang="en-US" sz="2000" dirty="0">
                 <a:latin typeface="Times New Roman" panose="02020603050405020304" pitchFamily="18" charset="0"/>
                 <a:cs typeface="Times New Roman" panose="02020603050405020304" pitchFamily="18" charset="0"/>
                 <a:sym typeface="+mn-ea"/>
@@ -9198,7 +9213,7 @@
               <a:buNone/>
             </a:pPr>
             <a:r>
-              <a:rPr lang="en-US" sz="2800" b="1" dirty="0" smtClean="0">
+              <a:rPr lang="en-US" sz="2800" b="1" dirty="0">
                 <a:latin typeface="Times New Roman" panose="02020603050405020304" pitchFamily="18" charset="0"/>
                 <a:cs typeface="Times New Roman" panose="02020603050405020304" pitchFamily="18" charset="0"/>
               </a:rPr>
@@ -9237,28 +9252,12 @@
               <a:buChar char="•"/>
             </a:pPr>
             <a:r>
-              <a:rPr lang="en-US" sz="2000" dirty="0" smtClean="0">
+              <a:rPr lang="en-US" sz="2000" dirty="0">
                 <a:latin typeface="Times New Roman" panose="02020603050405020304" pitchFamily="18" charset="0"/>
                 <a:cs typeface="Times New Roman" panose="02020603050405020304" pitchFamily="18" charset="0"/>
                 <a:sym typeface="+mn-ea"/>
               </a:rPr>
-              <a:t>Online exam provides </a:t>
-            </a:r>
-            <a:r>
-              <a:rPr lang="en-US" sz="2000" dirty="0" smtClean="0">
-                <a:latin typeface="Times New Roman" panose="02020603050405020304" pitchFamily="18" charset="0"/>
-                <a:cs typeface="Times New Roman" panose="02020603050405020304" pitchFamily="18" charset="0"/>
-                <a:sym typeface="+mn-ea"/>
-              </a:rPr>
-              <a:t>flexibility with limited </a:t>
-            </a:r>
-            <a:r>
-              <a:rPr lang="en-US" sz="2000" dirty="0" smtClean="0">
-                <a:latin typeface="Times New Roman" panose="02020603050405020304" pitchFamily="18" charset="0"/>
-                <a:cs typeface="Times New Roman" panose="02020603050405020304" pitchFamily="18" charset="0"/>
-                <a:sym typeface="+mn-ea"/>
-              </a:rPr>
-              <a:t>security to the examination process</a:t>
+              <a:t>Online exam provides flexibility with limited security to the examination process</a:t>
             </a:r>
           </a:p>
           <a:p>
@@ -9266,7 +9265,7 @@
               <a:buFont typeface="Arial" panose="020B0604020202020204" pitchFamily="34" charset="0"/>
               <a:buChar char="•"/>
             </a:pPr>
-            <a:endParaRPr lang="en-US" sz="2000" dirty="0" smtClean="0">
+            <a:endParaRPr lang="en-US" sz="2000" dirty="0">
               <a:latin typeface="Times New Roman" panose="02020603050405020304" pitchFamily="18" charset="0"/>
               <a:cs typeface="Times New Roman" panose="02020603050405020304" pitchFamily="18" charset="0"/>
               <a:sym typeface="+mn-ea"/>
@@ -9278,7 +9277,7 @@
               <a:buChar char="•"/>
             </a:pPr>
             <a:r>
-              <a:rPr lang="en-US" sz="2000" dirty="0" smtClean="0">
+              <a:rPr lang="en-US" sz="2000" dirty="0">
                 <a:latin typeface="Times New Roman" panose="02020603050405020304" pitchFamily="18" charset="0"/>
                 <a:cs typeface="Times New Roman" panose="02020603050405020304" pitchFamily="18" charset="0"/>
               </a:rPr>
@@ -9290,7 +9289,7 @@
               <a:buFont typeface="Arial" panose="020B0604020202020204" pitchFamily="34" charset="0"/>
               <a:buChar char="•"/>
             </a:pPr>
-            <a:endParaRPr lang="en-US" sz="2000" dirty="0" smtClean="0">
+            <a:endParaRPr lang="en-US" sz="2000" dirty="0">
               <a:latin typeface="Times New Roman" panose="02020603050405020304" pitchFamily="18" charset="0"/>
               <a:cs typeface="Times New Roman" panose="02020603050405020304" pitchFamily="18" charset="0"/>
             </a:endParaRPr>
@@ -9301,32 +9300,11 @@
               <a:buChar char="•"/>
             </a:pPr>
             <a:r>
-              <a:rPr lang="en-US" sz="2000" dirty="0" smtClean="0">
-                <a:latin typeface="Times New Roman" panose="02020603050405020304" pitchFamily="18" charset="0"/>
-                <a:cs typeface="Times New Roman" panose="02020603050405020304" pitchFamily="18" charset="0"/>
-              </a:rPr>
-              <a:t> </a:t>
-            </a:r>
-            <a:r>
               <a:rPr lang="en-US" sz="2000" dirty="0">
                 <a:latin typeface="Times New Roman" panose="02020603050405020304" pitchFamily="18" charset="0"/>
                 <a:cs typeface="Times New Roman" panose="02020603050405020304" pitchFamily="18" charset="0"/>
               </a:rPr>
-              <a:t>T</a:t>
-            </a:r>
-            <a:r>
-              <a:rPr lang="en-US" sz="2000" dirty="0" smtClean="0">
-                <a:latin typeface="Times New Roman" panose="02020603050405020304" pitchFamily="18" charset="0"/>
-                <a:cs typeface="Times New Roman" panose="02020603050405020304" pitchFamily="18" charset="0"/>
-              </a:rPr>
-              <a:t>he </a:t>
-            </a:r>
-            <a:r>
-              <a:rPr lang="en-US" sz="2000" dirty="0" smtClean="0">
-                <a:latin typeface="Times New Roman" panose="02020603050405020304" pitchFamily="18" charset="0"/>
-                <a:cs typeface="Times New Roman" panose="02020603050405020304" pitchFamily="18" charset="0"/>
-              </a:rPr>
-              <a:t>results are calculated instantly and accurately</a:t>
+              <a:t> The results are calculated instantly and accurately</a:t>
             </a:r>
             <a:endParaRPr lang="en-US" sz="2000" dirty="0"/>
           </a:p>
@@ -9354,17 +9332,10 @@
       </p:transition>
     </mc:Fallback>
   </mc:AlternateContent>
-  <p:timing>
-    <p:tnLst>
-      <p:par>
-        <p:cTn id="1" dur="indefinite" restart="never" nodeType="tmRoot"/>
-      </p:par>
-    </p:tnLst>
-  </p:timing>
 </p:sld>
 </file>
 
-<file path=ppt/slides/slide16.xml><?xml version="1.0" encoding="utf-8"?>
+<file path=ppt/slides/slide18.xml><?xml version="1.0" encoding="utf-8"?>
 <p:sld xmlns:a="http://schemas.openxmlformats.org/drawingml/2006/main" xmlns:r="http://schemas.openxmlformats.org/officeDocument/2006/relationships" xmlns:p="http://schemas.openxmlformats.org/presentationml/2006/main">
   <p:cSld>
     <p:spTree>
@@ -9650,7 +9621,7 @@
               <a:buNone/>
             </a:pPr>
             <a:r>
-              <a:rPr lang="en-US" sz="2800" b="1" dirty="0" smtClean="0">
+              <a:rPr lang="en-US" sz="2800" b="1" dirty="0">
                 <a:solidFill>
                   <a:schemeClr val="tx1"/>
                 </a:solidFill>
@@ -9659,13 +9630,6 @@
               </a:rPr>
               <a:t>CONCLUSION</a:t>
             </a:r>
-            <a:endParaRPr lang="en-US" sz="2800" b="1" dirty="0">
-              <a:solidFill>
-                <a:schemeClr val="tx1"/>
-              </a:solidFill>
-              <a:latin typeface="Times New Roman" panose="02020603050405020304" pitchFamily="18" charset="0"/>
-              <a:cs typeface="Times New Roman" panose="02020603050405020304" pitchFamily="18" charset="0"/>
-            </a:endParaRPr>
           </a:p>
         </p:txBody>
       </p:sp>
@@ -9691,7 +9655,7 @@
           <a:lstStyle/>
           <a:p>
             <a:pPr algn="ctr"/>
-            <a:endParaRPr lang="en-US" sz="2000" dirty="0" smtClean="0">
+            <a:endParaRPr lang="en-US" sz="2000" dirty="0">
               <a:latin typeface="Times New Roman" panose="02020603050405020304" pitchFamily="18" charset="0"/>
               <a:cs typeface="Times New Roman" panose="02020603050405020304" pitchFamily="18" charset="0"/>
             </a:endParaRPr>
@@ -9699,21 +9663,21 @@
           <a:p>
             <a:pPr algn="ctr"/>
             <a:r>
-              <a:rPr lang="en-US" sz="2000" dirty="0" smtClean="0">
+              <a:rPr lang="en-US" sz="2000" dirty="0">
                 <a:latin typeface="Times New Roman" panose="02020603050405020304" pitchFamily="18" charset="0"/>
                 <a:cs typeface="Times New Roman" panose="02020603050405020304" pitchFamily="18" charset="0"/>
               </a:rPr>
               <a:t>The primary objective of creating an online examination system to thoroughly and efficiently evaluate the candidate using a fully automated system has been attempted and resulted in this project called ‘Secure And Efficient Online Exam Management System for </a:t>
             </a:r>
             <a:r>
-              <a:rPr lang="en-US" sz="2000" dirty="0" err="1" smtClean="0">
+              <a:rPr lang="en-US" sz="2000" dirty="0" err="1">
                 <a:latin typeface="Times New Roman" panose="02020603050405020304" pitchFamily="18" charset="0"/>
                 <a:cs typeface="Times New Roman" panose="02020603050405020304" pitchFamily="18" charset="0"/>
               </a:rPr>
               <a:t>Thiagarajar</a:t>
             </a:r>
             <a:r>
-              <a:rPr lang="en-US" sz="2000" dirty="0" smtClean="0">
+              <a:rPr lang="en-US" sz="2000" dirty="0">
                 <a:latin typeface="Times New Roman" panose="02020603050405020304" pitchFamily="18" charset="0"/>
                 <a:cs typeface="Times New Roman" panose="02020603050405020304" pitchFamily="18" charset="0"/>
               </a:rPr>
@@ -9722,14 +9686,14 @@
           </a:p>
           <a:p>
             <a:pPr algn="ctr"/>
-            <a:endParaRPr lang="en-US" sz="2000" dirty="0" smtClean="0">
+            <a:endParaRPr lang="en-US" sz="2000" dirty="0">
               <a:latin typeface="Times New Roman" panose="02020603050405020304" pitchFamily="18" charset="0"/>
               <a:cs typeface="Times New Roman" panose="02020603050405020304" pitchFamily="18" charset="0"/>
             </a:endParaRPr>
           </a:p>
           <a:p>
             <a:pPr algn="ctr"/>
-            <a:endParaRPr lang="en-US" sz="2000" dirty="0" smtClean="0">
+            <a:endParaRPr lang="en-US" sz="2000" dirty="0">
               <a:latin typeface="Times New Roman" panose="02020603050405020304" pitchFamily="18" charset="0"/>
               <a:cs typeface="Times New Roman" panose="02020603050405020304" pitchFamily="18" charset="0"/>
             </a:endParaRPr>
@@ -9760,13 +9724,6 @@
       </p:transition>
     </mc:Fallback>
   </mc:AlternateContent>
-  <p:timing>
-    <p:tnLst>
-      <p:par>
-        <p:cTn id="1" dur="indefinite" restart="never" nodeType="tmRoot"/>
-      </p:par>
-    </p:tnLst>
-  </p:timing>
 </p:sld>
 </file>
 
@@ -9817,7 +9774,7 @@
               <a:buChar char="§"/>
             </a:pPr>
             <a:r>
-              <a:rPr lang="en-US" sz="2000" dirty="0" smtClean="0">
+              <a:rPr lang="en-US" sz="2000" dirty="0">
                 <a:solidFill>
                   <a:schemeClr val="tx1"/>
                 </a:solidFill>
@@ -9837,7 +9794,7 @@
               <a:buChar char="§"/>
             </a:pPr>
             <a:r>
-              <a:rPr lang="en-US" sz="2000" dirty="0" smtClean="0">
+              <a:rPr lang="en-US" sz="2000" dirty="0">
                 <a:solidFill>
                   <a:schemeClr val="tx1"/>
                 </a:solidFill>
@@ -9857,7 +9814,7 @@
               <a:buChar char="§"/>
             </a:pPr>
             <a:r>
-              <a:rPr lang="en-US" sz="2000" dirty="0" smtClean="0">
+              <a:rPr lang="en-US" sz="2000" dirty="0">
                 <a:solidFill>
                   <a:schemeClr val="tx1"/>
                 </a:solidFill>
@@ -9877,7 +9834,7 @@
               <a:buChar char="§"/>
             </a:pPr>
             <a:r>
-              <a:rPr lang="en-US" sz="2000" dirty="0" smtClean="0">
+              <a:rPr lang="en-US" sz="2000" dirty="0">
                 <a:solidFill>
                   <a:schemeClr val="tx1"/>
                 </a:solidFill>
@@ -9897,7 +9854,7 @@
               <a:buChar char="§"/>
             </a:pPr>
             <a:r>
-              <a:rPr lang="en-US" sz="2000" dirty="0" smtClean="0">
+              <a:rPr lang="en-US" sz="2000" dirty="0">
                 <a:solidFill>
                   <a:schemeClr val="tx1"/>
                 </a:solidFill>
@@ -9917,7 +9874,7 @@
               <a:buChar char="§"/>
             </a:pPr>
             <a:r>
-              <a:rPr lang="en-US" sz="2000" dirty="0" smtClean="0">
+              <a:rPr lang="en-US" sz="2000" dirty="0">
                 <a:solidFill>
                   <a:schemeClr val="tx1"/>
                 </a:solidFill>
@@ -9937,7 +9894,7 @@
               <a:buChar char="§"/>
             </a:pPr>
             <a:r>
-              <a:rPr lang="en-US" sz="2000" dirty="0" smtClean="0">
+              <a:rPr lang="en-US" sz="2000" dirty="0">
                 <a:solidFill>
                   <a:schemeClr val="tx1"/>
                 </a:solidFill>
@@ -9957,7 +9914,7 @@
               <a:buChar char="§"/>
             </a:pPr>
             <a:r>
-              <a:rPr lang="en-US" sz="2000" dirty="0" smtClean="0">
+              <a:rPr lang="en-US" sz="2000" dirty="0">
                 <a:solidFill>
                   <a:schemeClr val="tx1"/>
                 </a:solidFill>
@@ -9996,16 +9953,12 @@
               <a:buNone/>
             </a:pPr>
             <a:r>
-              <a:rPr lang="en-US" sz="3200" b="1" dirty="0" smtClean="0">
+              <a:rPr lang="en-US" sz="3200" b="1" dirty="0">
                 <a:latin typeface="Times New Roman" panose="02020603050405020304" pitchFamily="18" charset="0"/>
                 <a:cs typeface="Times New Roman" panose="02020603050405020304" pitchFamily="18" charset="0"/>
               </a:rPr>
               <a:t>MODULES</a:t>
             </a:r>
-            <a:endParaRPr lang="en-US" sz="3200" b="1" dirty="0">
-              <a:latin typeface="Times New Roman" panose="02020603050405020304" pitchFamily="18" charset="0"/>
-              <a:cs typeface="Times New Roman" panose="02020603050405020304" pitchFamily="18" charset="0"/>
-            </a:endParaRPr>
           </a:p>
         </p:txBody>
       </p:sp>
@@ -10248,16 +10201,12 @@
               <a:buNone/>
             </a:pPr>
             <a:r>
-              <a:rPr lang="en-US" sz="3200" b="1" dirty="0" smtClean="0">
+              <a:rPr lang="en-US" sz="3200" b="1" dirty="0">
                 <a:latin typeface="Times New Roman" panose="02020603050405020304" pitchFamily="18" charset="0"/>
                 <a:cs typeface="Times New Roman" panose="02020603050405020304" pitchFamily="18" charset="0"/>
               </a:rPr>
               <a:t>OBJECTIVE</a:t>
             </a:r>
-            <a:endParaRPr lang="en-US" sz="3200" b="1" dirty="0">
-              <a:latin typeface="Times New Roman" panose="02020603050405020304" pitchFamily="18" charset="0"/>
-              <a:cs typeface="Times New Roman" panose="02020603050405020304" pitchFamily="18" charset="0"/>
-            </a:endParaRPr>
           </a:p>
         </p:txBody>
       </p:sp>
@@ -10283,20 +10232,12 @@
           <a:lstStyle/>
           <a:p>
             <a:r>
-              <a:rPr lang="en-US" sz="2000" dirty="0" smtClean="0">
-                <a:latin typeface="Times New Roman" panose="02020603050405020304" pitchFamily="18" charset="0"/>
-                <a:ea typeface="Cambria" panose="02040503050406030204" pitchFamily="18" charset="0"/>
-                <a:cs typeface="Times New Roman" panose="02020603050405020304" pitchFamily="18" charset="0"/>
-              </a:rPr>
-              <a:t>To </a:t>
-            </a:r>
-            <a:r>
               <a:rPr lang="en-US" sz="2000" dirty="0">
                 <a:latin typeface="Times New Roman" panose="02020603050405020304" pitchFamily="18" charset="0"/>
                 <a:ea typeface="Cambria" panose="02040503050406030204" pitchFamily="18" charset="0"/>
                 <a:cs typeface="Times New Roman" panose="02020603050405020304" pitchFamily="18" charset="0"/>
               </a:rPr>
-              <a:t>evaluate students efficiently using an automated approach that takes less time and produces reliable results </a:t>
+              <a:t>To evaluate students efficiently using an automated approach that takes less time and produces reliable results </a:t>
             </a:r>
           </a:p>
         </p:txBody>
@@ -10318,13 +10259,6 @@
       </p:transition>
     </mc:Fallback>
   </mc:AlternateContent>
-  <p:timing>
-    <p:tnLst>
-      <p:par>
-        <p:cTn id="1" dur="indefinite" restart="never" nodeType="tmRoot"/>
-      </p:par>
-    </p:tnLst>
-  </p:timing>
 </p:sld>
 </file>
 
@@ -10371,7 +10305,7 @@
               <a:buNone/>
             </a:pPr>
             <a:r>
-              <a:rPr lang="en-US" sz="3200" b="1" dirty="0" smtClean="0">
+              <a:rPr lang="en-US" sz="3200" b="1" dirty="0">
                 <a:solidFill>
                   <a:schemeClr val="tx1"/>
                 </a:solidFill>
@@ -10430,13 +10364,6 @@
       </p:transition>
     </mc:Fallback>
   </mc:AlternateContent>
-  <p:timing>
-    <p:tnLst>
-      <p:par>
-        <p:cTn id="1" dur="indefinite" restart="never" nodeType="tmRoot"/>
-      </p:par>
-    </p:tnLst>
-  </p:timing>
 </p:sld>
 </file>
 
@@ -10483,7 +10410,7 @@
               <a:buNone/>
             </a:pPr>
             <a:r>
-              <a:rPr lang="en-US" sz="2800" b="1" dirty="0" smtClean="0">
+              <a:rPr lang="en-US" sz="2800" b="1" dirty="0">
                 <a:solidFill>
                   <a:schemeClr val="tx1"/>
                 </a:solidFill>
@@ -10492,13 +10419,6 @@
               </a:rPr>
               <a:t>LOGIN MODULE</a:t>
             </a:r>
-            <a:endParaRPr lang="en-US" sz="2800" b="1" dirty="0">
-              <a:solidFill>
-                <a:schemeClr val="tx1"/>
-              </a:solidFill>
-              <a:latin typeface="Times New Roman" panose="02020603050405020304" pitchFamily="18" charset="0"/>
-              <a:cs typeface="Times New Roman" panose="02020603050405020304" pitchFamily="18" charset="0"/>
-            </a:endParaRPr>
           </a:p>
         </p:txBody>
       </p:sp>
@@ -10628,21 +10548,7 @@
                 <a:latin typeface="Times New Roman" panose="02020603050405020304" pitchFamily="18" charset="0"/>
                 <a:cs typeface="Times New Roman" panose="02020603050405020304" pitchFamily="18" charset="0"/>
               </a:rPr>
-              <a:t>Prevents from </a:t>
-            </a:r>
-            <a:r>
-              <a:rPr lang="en-US" sz="2000" dirty="0" smtClean="0">
-                <a:latin typeface="Times New Roman" panose="02020603050405020304" pitchFamily="18" charset="0"/>
-                <a:cs typeface="Times New Roman" panose="02020603050405020304" pitchFamily="18" charset="0"/>
-              </a:rPr>
-              <a:t>unauthorized </a:t>
-            </a:r>
-            <a:r>
-              <a:rPr lang="en-US" sz="2000" dirty="0">
-                <a:latin typeface="Times New Roman" panose="02020603050405020304" pitchFamily="18" charset="0"/>
-                <a:cs typeface="Times New Roman" panose="02020603050405020304" pitchFamily="18" charset="0"/>
-              </a:rPr>
-              <a:t>individuals</a:t>
+              <a:t>Prevents from unauthorized individuals</a:t>
             </a:r>
           </a:p>
           <a:p>
@@ -10673,10 +10579,6 @@
               </a:rPr>
               <a:t>Each administrator, instructor, and student has their own login module</a:t>
             </a:r>
-            <a:endParaRPr lang="en-US" sz="2000" dirty="0" smtClean="0">
-              <a:latin typeface="Times New Roman" panose="02020603050405020304" pitchFamily="18" charset="0"/>
-              <a:cs typeface="Times New Roman" panose="02020603050405020304" pitchFamily="18" charset="0"/>
-            </a:endParaRPr>
           </a:p>
         </p:txBody>
       </p:sp>
@@ -10811,18 +10713,13 @@
           </a:lstStyle>
           <a:p>
             <a:r>
-              <a:rPr lang="en-US" altLang="en-IN" sz="2800" b="1" dirty="0" smtClean="0">
+              <a:rPr lang="en-US" altLang="en-IN" sz="2800" b="1" dirty="0">
                 <a:effectLst/>
                 <a:latin typeface="Times New Roman" panose="02020603050405020304" pitchFamily="18" charset="0"/>
                 <a:cs typeface="Times New Roman" panose="02020603050405020304" pitchFamily="18" charset="0"/>
               </a:rPr>
               <a:t>Admin Login</a:t>
             </a:r>
-            <a:endParaRPr lang="en-US" altLang="en-IN" sz="2800" b="1" dirty="0">
-              <a:effectLst/>
-              <a:latin typeface="Times New Roman" panose="02020603050405020304" pitchFamily="18" charset="0"/>
-              <a:cs typeface="Times New Roman" panose="02020603050405020304" pitchFamily="18" charset="0"/>
-            </a:endParaRPr>
           </a:p>
         </p:txBody>
       </p:sp>
@@ -10872,13 +10769,6 @@
       </p:transition>
     </mc:Fallback>
   </mc:AlternateContent>
-  <p:timing>
-    <p:tnLst>
-      <p:par>
-        <p:cTn id="1" dur="indefinite" restart="never" nodeType="tmRoot"/>
-      </p:par>
-    </p:tnLst>
-  </p:timing>
 </p:sld>
 </file>
 
@@ -10930,21 +10820,8 @@
                 <a:latin typeface="Times New Roman" panose="02020603050405020304" pitchFamily="18" charset="0"/>
                 <a:cs typeface="Times New Roman" panose="02020603050405020304" pitchFamily="18" charset="0"/>
               </a:rPr>
-              <a:t>Faculty </a:t>
-            </a:r>
-            <a:r>
-              <a:rPr lang="en-US" altLang="en-IN" sz="2800" b="1" dirty="0" smtClean="0">
-                <a:effectLst/>
-                <a:latin typeface="Times New Roman" panose="02020603050405020304" pitchFamily="18" charset="0"/>
-                <a:cs typeface="Times New Roman" panose="02020603050405020304" pitchFamily="18" charset="0"/>
-              </a:rPr>
-              <a:t>Login </a:t>
-            </a:r>
-            <a:endParaRPr lang="en-US" altLang="en-IN" sz="2800" b="1" dirty="0">
-              <a:effectLst/>
-              <a:latin typeface="Times New Roman" panose="02020603050405020304" pitchFamily="18" charset="0"/>
-              <a:cs typeface="Times New Roman" panose="02020603050405020304" pitchFamily="18" charset="0"/>
-            </a:endParaRPr>
+              <a:t>Faculty Login </a:t>
+            </a:r>
           </a:p>
         </p:txBody>
       </p:sp>
@@ -11051,7 +10928,7 @@
           <a:p>
             <a:pPr algn="ctr"/>
             <a:r>
-              <a:rPr lang="en-US" altLang="en-IN" sz="2800" b="1" dirty="0" smtClean="0">
+              <a:rPr lang="en-US" altLang="en-IN" sz="2800" b="1" dirty="0">
                 <a:effectLst/>
                 <a:latin typeface="Times New Roman" panose="02020603050405020304" pitchFamily="18" charset="0"/>
                 <a:cs typeface="Times New Roman" panose="02020603050405020304" pitchFamily="18" charset="0"/>
@@ -11210,13 +11087,6 @@
       </p:transition>
     </mc:Fallback>
   </mc:AlternateContent>
-  <p:timing>
-    <p:tnLst>
-      <p:par>
-        <p:cTn id="1" dur="indefinite" restart="never" nodeType="tmRoot"/>
-      </p:par>
-    </p:tnLst>
-  </p:timing>
 </p:sld>
 </file>
 
@@ -11416,7 +11286,7 @@
               <a:buNone/>
             </a:pPr>
             <a:r>
-              <a:rPr lang="en-US" sz="2000" dirty="0" smtClean="0">
+              <a:rPr lang="en-US" sz="2000" dirty="0">
                 <a:solidFill>
                   <a:schemeClr val="tx1"/>
                 </a:solidFill>
@@ -11454,7 +11324,7 @@
               <a:buNone/>
             </a:pPr>
             <a:r>
-              <a:rPr lang="en-US" sz="2800" b="1" dirty="0" smtClean="0">
+              <a:rPr lang="en-US" sz="2800" b="1" dirty="0">
                 <a:solidFill>
                   <a:schemeClr val="tx1"/>
                 </a:solidFill>
@@ -11463,13 +11333,6 @@
               </a:rPr>
               <a:t>FORGET PASSWORD</a:t>
             </a:r>
-            <a:endParaRPr lang="en-US" sz="2800" b="1" dirty="0">
-              <a:solidFill>
-                <a:schemeClr val="tx1"/>
-              </a:solidFill>
-              <a:latin typeface="Times New Roman" panose="02020603050405020304" pitchFamily="18" charset="0"/>
-              <a:cs typeface="Times New Roman" panose="02020603050405020304" pitchFamily="18" charset="0"/>
-            </a:endParaRPr>
           </a:p>
         </p:txBody>
       </p:sp>
@@ -11581,13 +11444,6 @@
       </p:transition>
     </mc:Fallback>
   </mc:AlternateContent>
-  <p:timing>
-    <p:tnLst>
-      <p:par>
-        <p:cTn id="1" dur="indefinite" restart="never" nodeType="tmRoot"/>
-      </p:par>
-    </p:tnLst>
-  </p:timing>
 </p:sld>
 </file>
 
@@ -11729,7 +11585,7 @@
               <a:buNone/>
             </a:pPr>
             <a:r>
-              <a:rPr lang="en-US" sz="2000" dirty="0" smtClean="0">
+              <a:rPr lang="en-US" sz="2000" dirty="0">
                 <a:solidFill>
                   <a:schemeClr val="tx1"/>
                 </a:solidFill>
@@ -11807,13 +11663,6 @@
   <p:transition spd="slow">
     <p:cover/>
   </p:transition>
-  <p:timing>
-    <p:tnLst>
-      <p:par>
-        <p:cTn id="1" dur="indefinite" restart="never" nodeType="tmRoot"/>
-      </p:par>
-    </p:tnLst>
-  </p:timing>
 </p:sld>
 </file>
 
@@ -11860,7 +11709,7 @@
               <a:buNone/>
             </a:pPr>
             <a:r>
-              <a:rPr lang="en-US" sz="2000" b="1" dirty="0" smtClean="0">
+              <a:rPr lang="en-US" sz="2000" b="1" dirty="0">
                 <a:effectLst/>
                 <a:latin typeface="Times New Roman" panose="02020603050405020304" pitchFamily="18" charset="0"/>
                 <a:cs typeface="Times New Roman" panose="02020603050405020304" pitchFamily="18" charset="0"/>
@@ -11901,7 +11750,7 @@
               <a:buNone/>
             </a:pPr>
             <a:r>
-              <a:rPr lang="en-US" sz="2800" b="1" dirty="0" smtClean="0">
+              <a:rPr lang="en-US" sz="2800" b="1" dirty="0">
                 <a:solidFill>
                   <a:schemeClr val="tx1"/>
                 </a:solidFill>
@@ -11910,13 +11759,6 @@
               </a:rPr>
               <a:t>REGISTRATION MODULE</a:t>
             </a:r>
-            <a:endParaRPr lang="en-US" sz="2800" b="1" dirty="0">
-              <a:solidFill>
-                <a:schemeClr val="tx1"/>
-              </a:solidFill>
-              <a:latin typeface="Times New Roman" panose="02020603050405020304" pitchFamily="18" charset="0"/>
-              <a:cs typeface="Times New Roman" panose="02020603050405020304" pitchFamily="18" charset="0"/>
-            </a:endParaRPr>
           </a:p>
         </p:txBody>
       </p:sp>
@@ -11951,21 +11793,8 @@
                 <a:cs typeface="Times New Roman" panose="02020603050405020304" pitchFamily="18" charset="0"/>
                 <a:sym typeface="+mn-ea"/>
               </a:rPr>
-              <a:t>The administrator offers both a password and an email address to instructors and students for </a:t>
-            </a:r>
-            <a:r>
-              <a:rPr lang="en-US" sz="2000" dirty="0" smtClean="0">
-                <a:latin typeface="Times New Roman" panose="02020603050405020304" pitchFamily="18" charset="0"/>
-                <a:cs typeface="Times New Roman" panose="02020603050405020304" pitchFamily="18" charset="0"/>
-                <a:sym typeface="+mn-ea"/>
-              </a:rPr>
-              <a:t>login</a:t>
-            </a:r>
-            <a:endParaRPr lang="en-US" sz="2000" dirty="0">
-              <a:latin typeface="Times New Roman" panose="02020603050405020304" pitchFamily="18" charset="0"/>
-              <a:cs typeface="Times New Roman" panose="02020603050405020304" pitchFamily="18" charset="0"/>
-              <a:sym typeface="+mn-ea"/>
-            </a:endParaRPr>
+              <a:t>The administrator offers both a password and an email address to instructors and students for login</a:t>
+            </a:r>
           </a:p>
         </p:txBody>
       </p:sp>
@@ -12101,7 +11930,7 @@
           </a:lstStyle>
           <a:p>
             <a:r>
-              <a:rPr lang="en-US" sz="2000" b="1" dirty="0" smtClean="0">
+              <a:rPr lang="en-US" sz="2000" b="1" dirty="0">
                 <a:effectLst/>
                 <a:latin typeface="Times New Roman" panose="02020603050405020304" pitchFamily="18" charset="0"/>
                 <a:cs typeface="Times New Roman" panose="02020603050405020304" pitchFamily="18" charset="0"/>
@@ -12163,13 +11992,6 @@
       </p:transition>
     </mc:Fallback>
   </mc:AlternateContent>
-  <p:timing>
-    <p:tnLst>
-      <p:par>
-        <p:cTn id="1" dur="indefinite" restart="never" nodeType="tmRoot"/>
-      </p:par>
-    </p:tnLst>
-  </p:timing>
 </p:sld>
 </file>
 
@@ -12216,7 +12038,7 @@
               <a:buNone/>
             </a:pPr>
             <a:r>
-              <a:rPr lang="en-US" sz="2800" b="1" dirty="0" smtClean="0">
+              <a:rPr lang="en-US" sz="2800" b="1" dirty="0">
                 <a:solidFill>
                   <a:schemeClr val="tx1"/>
                 </a:solidFill>
@@ -12225,13 +12047,6 @@
               </a:rPr>
               <a:t>DEPARTMENT MODULE</a:t>
             </a:r>
-            <a:endParaRPr lang="en-US" sz="2800" b="1" dirty="0">
-              <a:solidFill>
-                <a:schemeClr val="tx1"/>
-              </a:solidFill>
-              <a:latin typeface="Times New Roman" panose="02020603050405020304" pitchFamily="18" charset="0"/>
-              <a:cs typeface="Times New Roman" panose="02020603050405020304" pitchFamily="18" charset="0"/>
-            </a:endParaRPr>
           </a:p>
         </p:txBody>
       </p:sp>
@@ -12340,13 +12155,6 @@
       </p:transition>
     </mc:Fallback>
   </mc:AlternateContent>
-  <p:timing>
-    <p:tnLst>
-      <p:par>
-        <p:cTn id="1" dur="indefinite" restart="never" nodeType="tmRoot"/>
-      </p:par>
-    </p:tnLst>
-  </p:timing>
 </p:sld>
 </file>
 

</xml_diff>